<commit_message>
Modified presentation for Digital Study Group
</commit_message>
<xml_diff>
--- a/SESG – GIT.pptx
+++ b/SESG – GIT.pptx
@@ -6,21 +6,25 @@
     <p:sldMasterId id="2147483682" r:id="rId2"/>
   </p:sldMasterIdLst>
   <p:notesMasterIdLst>
-    <p:notesMasterId r:id="rId12"/>
+    <p:notesMasterId r:id="rId16"/>
   </p:notesMasterIdLst>
   <p:handoutMasterIdLst>
-    <p:handoutMasterId r:id="rId13"/>
+    <p:handoutMasterId r:id="rId17"/>
   </p:handoutMasterIdLst>
   <p:sldIdLst>
     <p:sldId id="256" r:id="rId3"/>
-    <p:sldId id="257" r:id="rId4"/>
-    <p:sldId id="258" r:id="rId5"/>
-    <p:sldId id="259" r:id="rId6"/>
-    <p:sldId id="260" r:id="rId7"/>
-    <p:sldId id="261" r:id="rId8"/>
-    <p:sldId id="264" r:id="rId9"/>
-    <p:sldId id="265" r:id="rId10"/>
-    <p:sldId id="263" r:id="rId11"/>
+    <p:sldId id="266" r:id="rId4"/>
+    <p:sldId id="257" r:id="rId5"/>
+    <p:sldId id="258" r:id="rId6"/>
+    <p:sldId id="259" r:id="rId7"/>
+    <p:sldId id="260" r:id="rId8"/>
+    <p:sldId id="261" r:id="rId9"/>
+    <p:sldId id="268" r:id="rId10"/>
+    <p:sldId id="269" r:id="rId11"/>
+    <p:sldId id="267" r:id="rId12"/>
+    <p:sldId id="264" r:id="rId13"/>
+    <p:sldId id="265" r:id="rId14"/>
+    <p:sldId id="263" r:id="rId15"/>
   </p:sldIdLst>
   <p:sldSz cx="9144000" cy="6858000" type="screen4x3"/>
   <p:notesSz cx="7010400" cy="9236075"/>
@@ -241,7 +245,7 @@
             </a:lvl1pPr>
           </a:lstStyle>
           <a:p>
-            <a:endParaRPr lang="en-US"/>
+            <a:endParaRPr lang="en-US" dirty="0"/>
           </a:p>
         </p:txBody>
       </p:sp>
@@ -274,9 +278,9 @@
           <a:p>
             <a:fld id="{851164D0-0A25-4F83-BC94-7519FA954AD9}" type="datetimeFigureOut">
               <a:rPr lang="en-US" smtClean="0"/>
-              <a:t>1/18/2017</a:t>
+              <a:t>1/19/2017</a:t>
             </a:fld>
-            <a:endParaRPr lang="en-US"/>
+            <a:endParaRPr lang="en-US" dirty="0"/>
           </a:p>
         </p:txBody>
       </p:sp>
@@ -307,7 +311,7 @@
             </a:lvl1pPr>
           </a:lstStyle>
           <a:p>
-            <a:endParaRPr lang="en-US"/>
+            <a:endParaRPr lang="en-US" dirty="0"/>
           </a:p>
         </p:txBody>
       </p:sp>
@@ -342,7 +346,7 @@
               <a:rPr lang="en-US" smtClean="0"/>
               <a:t>‹#›</a:t>
             </a:fld>
-            <a:endParaRPr lang="en-US"/>
+            <a:endParaRPr lang="en-US" dirty="0"/>
           </a:p>
         </p:txBody>
       </p:sp>
@@ -406,7 +410,7 @@
             </a:lvl1pPr>
           </a:lstStyle>
           <a:p>
-            <a:endParaRPr lang="en-US"/>
+            <a:endParaRPr lang="en-US" dirty="0"/>
           </a:p>
         </p:txBody>
       </p:sp>
@@ -439,9 +443,9 @@
           <a:p>
             <a:fld id="{85E96945-5659-4738-9EB3-3087F347442F}" type="datetimeFigureOut">
               <a:rPr lang="en-US" smtClean="0"/>
-              <a:t>1/18/2017</a:t>
+              <a:t>1/19/2017</a:t>
             </a:fld>
-            <a:endParaRPr lang="en-US"/>
+            <a:endParaRPr lang="en-US" dirty="0"/>
           </a:p>
         </p:txBody>
       </p:sp>
@@ -474,7 +478,7 @@
           <a:bodyPr vert="horz" lIns="91440" tIns="45720" rIns="91440" bIns="45720" rtlCol="0" anchor="ctr"/>
           <a:lstStyle/>
           <a:p>
-            <a:endParaRPr lang="en-US"/>
+            <a:endParaRPr lang="en-US" dirty="0"/>
           </a:p>
         </p:txBody>
       </p:sp>
@@ -565,7 +569,7 @@
             </a:lvl1pPr>
           </a:lstStyle>
           <a:p>
-            <a:endParaRPr lang="en-US"/>
+            <a:endParaRPr lang="en-US" dirty="0"/>
           </a:p>
         </p:txBody>
       </p:sp>
@@ -600,7 +604,7 @@
               <a:rPr lang="en-US" smtClean="0"/>
               <a:t>‹#›</a:t>
             </a:fld>
-            <a:endParaRPr lang="en-US"/>
+            <a:endParaRPr lang="en-US" dirty="0"/>
           </a:p>
         </p:txBody>
       </p:sp>
@@ -1055,7 +1059,7 @@
               <a:pPr/>
               <a:t>‹#›</a:t>
             </a:fld>
-            <a:endParaRPr lang="en-US"/>
+            <a:endParaRPr lang="en-US" dirty="0"/>
           </a:p>
         </p:txBody>
       </p:sp>
@@ -1473,7 +1477,7 @@
               <a:pPr/>
               <a:t>‹#›</a:t>
             </a:fld>
-            <a:endParaRPr lang="en-US"/>
+            <a:endParaRPr lang="en-US" dirty="0"/>
           </a:p>
         </p:txBody>
       </p:sp>
@@ -1736,7 +1740,7 @@
               <a:pPr/>
               <a:t>‹#›</a:t>
             </a:fld>
-            <a:endParaRPr lang="en-US"/>
+            <a:endParaRPr lang="en-US" dirty="0"/>
           </a:p>
         </p:txBody>
       </p:sp>
@@ -1999,7 +2003,7 @@
               <a:pPr/>
               <a:t>‹#›</a:t>
             </a:fld>
-            <a:endParaRPr lang="en-US"/>
+            <a:endParaRPr lang="en-US" dirty="0"/>
           </a:p>
         </p:txBody>
       </p:sp>
@@ -2192,7 +2196,7 @@
               <a:pPr/>
               <a:t>‹#›</a:t>
             </a:fld>
-            <a:endParaRPr lang="en-US"/>
+            <a:endParaRPr lang="en-US" dirty="0"/>
           </a:p>
         </p:txBody>
       </p:sp>
@@ -2473,9 +2477,9 @@
           <a:p>
             <a:fld id="{87DC9D52-9E7D-4D99-AC6A-51BB32896C61}" type="datetimeFigureOut">
               <a:rPr lang="en-US" smtClean="0"/>
-              <a:t>1/18/2017</a:t>
+              <a:t>1/19/2017</a:t>
             </a:fld>
-            <a:endParaRPr lang="en-US"/>
+            <a:endParaRPr lang="en-US" dirty="0"/>
           </a:p>
         </p:txBody>
       </p:sp>
@@ -2494,7 +2498,7 @@
           <a:bodyPr/>
           <a:lstStyle/>
           <a:p>
-            <a:endParaRPr lang="en-US"/>
+            <a:endParaRPr lang="en-US" dirty="0"/>
           </a:p>
         </p:txBody>
       </p:sp>
@@ -2517,7 +2521,7 @@
               <a:rPr lang="en-US" smtClean="0"/>
               <a:t>‹#›</a:t>
             </a:fld>
-            <a:endParaRPr lang="en-US"/>
+            <a:endParaRPr lang="en-US" dirty="0"/>
           </a:p>
         </p:txBody>
       </p:sp>
@@ -2643,9 +2647,9 @@
           <a:p>
             <a:fld id="{87DC9D52-9E7D-4D99-AC6A-51BB32896C61}" type="datetimeFigureOut">
               <a:rPr lang="en-US" smtClean="0"/>
-              <a:t>1/18/2017</a:t>
+              <a:t>1/19/2017</a:t>
             </a:fld>
-            <a:endParaRPr lang="en-US"/>
+            <a:endParaRPr lang="en-US" dirty="0"/>
           </a:p>
         </p:txBody>
       </p:sp>
@@ -2664,7 +2668,7 @@
           <a:bodyPr/>
           <a:lstStyle/>
           <a:p>
-            <a:endParaRPr lang="en-US"/>
+            <a:endParaRPr lang="en-US" dirty="0"/>
           </a:p>
         </p:txBody>
       </p:sp>
@@ -2687,7 +2691,7 @@
               <a:rPr lang="en-US" smtClean="0"/>
               <a:t>‹#›</a:t>
             </a:fld>
-            <a:endParaRPr lang="en-US"/>
+            <a:endParaRPr lang="en-US" dirty="0"/>
           </a:p>
         </p:txBody>
       </p:sp>
@@ -2876,7 +2880,7 @@
               <a:pPr/>
               <a:t>‹#›</a:t>
             </a:fld>
-            <a:endParaRPr lang="en-US"/>
+            <a:endParaRPr lang="en-US" dirty="0"/>
           </a:p>
         </p:txBody>
       </p:sp>
@@ -3437,9 +3441,9 @@
           <a:p>
             <a:fld id="{87DC9D52-9E7D-4D99-AC6A-51BB32896C61}" type="datetimeFigureOut">
               <a:rPr lang="en-US" smtClean="0"/>
-              <a:t>1/18/2017</a:t>
+              <a:t>1/19/2017</a:t>
             </a:fld>
-            <a:endParaRPr lang="en-US"/>
+            <a:endParaRPr lang="en-US" dirty="0"/>
           </a:p>
         </p:txBody>
       </p:sp>
@@ -3476,7 +3480,7 @@
             </a:lvl1pPr>
           </a:lstStyle>
           <a:p>
-            <a:endParaRPr lang="en-US"/>
+            <a:endParaRPr lang="en-US" dirty="0"/>
           </a:p>
         </p:txBody>
       </p:sp>
@@ -3517,7 +3521,7 @@
               <a:rPr lang="en-US" smtClean="0"/>
               <a:t>‹#›</a:t>
             </a:fld>
-            <a:endParaRPr lang="en-US"/>
+            <a:endParaRPr lang="en-US" dirty="0"/>
           </a:p>
         </p:txBody>
       </p:sp>
@@ -3820,19 +3824,7 @@
           <a:p>
             <a:r>
               <a:rPr lang="en-US" dirty="0" smtClean="0"/>
-              <a:t>SESG – </a:t>
-            </a:r>
-            <a:r>
-              <a:rPr lang="en-US" dirty="0" smtClean="0"/>
-              <a:t>GIT </a:t>
-            </a:r>
-            <a:r>
-              <a:rPr lang="en-US" smtClean="0"/>
-              <a:t>asdfasdfasdf</a:t>
-            </a:r>
-            <a:r>
-              <a:rPr lang="en-US" dirty="0" smtClean="0"/>
-              <a:t>	</a:t>
+              <a:t>Git</a:t>
             </a:r>
             <a:endParaRPr lang="en-US" dirty="0"/>
           </a:p>
@@ -3881,7 +3873,7 @@
 </p:sld>
 </file>
 
-<file path=ppt/slides/slide2.xml><?xml version="1.0" encoding="utf-8"?>
+<file path=ppt/slides/slide10.xml><?xml version="1.0" encoding="utf-8"?>
 <p:sld xmlns:a="http://schemas.openxmlformats.org/drawingml/2006/main" xmlns:r="http://schemas.openxmlformats.org/officeDocument/2006/relationships" xmlns:p="http://schemas.openxmlformats.org/presentationml/2006/main">
   <p:cSld>
     <p:spTree>
@@ -3915,28 +3907,20 @@
           <a:p>
             <a:r>
               <a:rPr lang="en-US" dirty="0" smtClean="0"/>
-              <a:t>What is </a:t>
-            </a:r>
-            <a:r>
-              <a:rPr lang="en-US" dirty="0" err="1" smtClean="0"/>
-              <a:t>Git</a:t>
-            </a:r>
-            <a:r>
-              <a:rPr lang="en-US" dirty="0" smtClean="0"/>
-              <a:t>?</a:t>
-            </a:r>
-            <a:endParaRPr lang="en-US" dirty="0"/>
-          </a:p>
-        </p:txBody>
-      </p:sp>
-      <p:sp>
-        <p:nvSpPr>
-          <p:cNvPr id="3" name="Content Placeholder 2"/>
-          <p:cNvSpPr>
-            <a:spLocks noGrp="1"/>
-          </p:cNvSpPr>
-          <p:nvPr>
-            <p:ph idx="1"/>
+              <a:t>Rebasing VS Merging</a:t>
+            </a:r>
+            <a:endParaRPr lang="en-US" dirty="0"/>
+          </a:p>
+        </p:txBody>
+      </p:sp>
+      <p:sp>
+        <p:nvSpPr>
+          <p:cNvPr id="4" name="Slide Number Placeholder 3"/>
+          <p:cNvSpPr>
+            <a:spLocks noGrp="1"/>
+          </p:cNvSpPr>
+          <p:nvPr>
+            <p:ph type="sldNum" sz="quarter" idx="10"/>
           </p:nvPr>
         </p:nvSpPr>
         <p:spPr/>
@@ -3944,120 +3928,43 @@
           <a:bodyPr/>
           <a:lstStyle/>
           <a:p>
-            <a:r>
-              <a:rPr lang="en-US" dirty="0" smtClean="0"/>
-              <a:t>Open source distributed revision control system</a:t>
-            </a:r>
-          </a:p>
-          <a:p>
-            <a:endParaRPr lang="en-US" dirty="0"/>
-          </a:p>
-          <a:p>
-            <a:r>
-              <a:rPr lang="en-US" dirty="0" smtClean="0"/>
-              <a:t>Created by Linus Torvalds and other Linux kernel developers</a:t>
-            </a:r>
-          </a:p>
-          <a:p>
-            <a:endParaRPr lang="en-US" dirty="0"/>
-          </a:p>
-          <a:p>
-            <a:r>
-              <a:rPr lang="en-US" dirty="0" smtClean="0"/>
-              <a:t>Launched in 2005 under GPLv2 license</a:t>
-            </a:r>
-          </a:p>
-          <a:p>
-            <a:endParaRPr lang="en-US" dirty="0"/>
-          </a:p>
-          <a:p>
-            <a:r>
-              <a:rPr lang="en-US" dirty="0" smtClean="0"/>
-              <a:t>Replaced </a:t>
-            </a:r>
-            <a:r>
-              <a:rPr lang="en-US" dirty="0" err="1" smtClean="0"/>
-              <a:t>BitKeeper</a:t>
-            </a:r>
-            <a:r>
-              <a:rPr lang="en-US" dirty="0" smtClean="0"/>
-              <a:t> as SCM system for the Linux kernel</a:t>
-            </a:r>
-          </a:p>
-          <a:p>
-            <a:endParaRPr lang="en-US" dirty="0"/>
-          </a:p>
-        </p:txBody>
-      </p:sp>
-      <p:sp>
-        <p:nvSpPr>
-          <p:cNvPr id="4" name="Slide Number Placeholder 3"/>
-          <p:cNvSpPr>
-            <a:spLocks noGrp="1"/>
-          </p:cNvSpPr>
-          <p:nvPr>
-            <p:ph type="sldNum" sz="quarter" idx="10"/>
-          </p:nvPr>
-        </p:nvSpPr>
-        <p:spPr/>
-        <p:txBody>
-          <a:bodyPr/>
-          <a:lstStyle/>
-          <a:p>
             <a:fld id="{2C54C99C-CE89-4C76-8DB1-E15D6EAB6684}" type="slidenum">
               <a:rPr lang="en-US" smtClean="0"/>
               <a:pPr/>
-              <a:t>2</a:t>
+              <a:t>10</a:t>
             </a:fld>
-            <a:endParaRPr lang="en-US"/>
+            <a:endParaRPr lang="en-US" dirty="0"/>
           </a:p>
         </p:txBody>
       </p:sp>
       <p:pic>
         <p:nvPicPr>
-          <p:cNvPr id="1028" name="Picture 4" descr="https://git-scm.com/images/logo@2x.png"/>
+          <p:cNvPr id="10" name="Picture 9"/>
           <p:cNvPicPr>
-            <a:picLocks noChangeAspect="1" noChangeArrowheads="1"/>
+            <a:picLocks noChangeAspect="1"/>
           </p:cNvPicPr>
           <p:nvPr/>
         </p:nvPicPr>
         <p:blipFill>
-          <a:blip r:embed="rId2">
-            <a:extLst>
-              <a:ext uri="{28A0092B-C50C-407E-A947-70E740481C1C}">
-                <a14:useLocalDpi xmlns:a14="http://schemas.microsoft.com/office/drawing/2010/main" val="0"/>
-              </a:ext>
-            </a:extLst>
-          </a:blip>
-          <a:srcRect/>
+          <a:blip r:embed="rId2"/>
           <a:stretch>
             <a:fillRect/>
           </a:stretch>
         </p:blipFill>
-        <p:spPr bwMode="auto">
+        <p:spPr>
           <a:xfrm>
-            <a:off x="6629527" y="5239492"/>
-            <a:ext cx="2095500" cy="876300"/>
+            <a:off x="1010165" y="1130129"/>
+            <a:ext cx="7239000" cy="4762500"/>
           </a:xfrm>
           <a:prstGeom prst="rect">
             <a:avLst/>
           </a:prstGeom>
-          <a:noFill/>
-          <a:extLst>
-            <a:ext uri="{909E8E84-426E-40DD-AFC4-6F175D3DCCD1}">
-              <a14:hiddenFill xmlns:a14="http://schemas.microsoft.com/office/drawing/2010/main">
-                <a:solidFill>
-                  <a:srgbClr val="FFFFFF"/>
-                </a:solidFill>
-              </a14:hiddenFill>
-            </a:ext>
-          </a:extLst>
         </p:spPr>
       </p:pic>
     </p:spTree>
     <p:extLst>
       <p:ext uri="{BB962C8B-B14F-4D97-AF65-F5344CB8AC3E}">
-        <p14:creationId xmlns:p14="http://schemas.microsoft.com/office/powerpoint/2010/main" val="2450265454"/>
+        <p14:creationId xmlns:p14="http://schemas.microsoft.com/office/powerpoint/2010/main" val="3497316240"/>
       </p:ext>
     </p:extLst>
   </p:cSld>
@@ -4074,7 +3981,7 @@
 </p:sld>
 </file>
 
-<file path=ppt/slides/slide3.xml><?xml version="1.0" encoding="utf-8"?>
+<file path=ppt/slides/slide11.xml><?xml version="1.0" encoding="utf-8"?>
 <p:sld xmlns:a="http://schemas.openxmlformats.org/drawingml/2006/main" xmlns:r="http://schemas.openxmlformats.org/officeDocument/2006/relationships" xmlns:p="http://schemas.openxmlformats.org/presentationml/2006/main">
   <p:cSld>
     <p:spTree>
@@ -4108,20 +4015,20 @@
           <a:p>
             <a:r>
               <a:rPr lang="en-US" dirty="0" smtClean="0"/>
-              <a:t>Centralized vs Distributed</a:t>
-            </a:r>
-            <a:endParaRPr lang="en-US" dirty="0"/>
-          </a:p>
-        </p:txBody>
-      </p:sp>
-      <p:sp>
-        <p:nvSpPr>
-          <p:cNvPr id="4" name="Slide Number Placeholder 3"/>
-          <p:cNvSpPr>
-            <a:spLocks noGrp="1"/>
-          </p:cNvSpPr>
-          <p:nvPr>
-            <p:ph type="sldNum" sz="quarter" idx="10"/>
+              <a:t>Commands</a:t>
+            </a:r>
+            <a:endParaRPr lang="en-US" dirty="0"/>
+          </a:p>
+        </p:txBody>
+      </p:sp>
+      <p:sp>
+        <p:nvSpPr>
+          <p:cNvPr id="3" name="Slide Number Placeholder 2"/>
+          <p:cNvSpPr>
+            <a:spLocks noGrp="1"/>
+          </p:cNvSpPr>
+          <p:nvPr>
+            <p:ph type="sldNum" sz="quarter" idx="4"/>
           </p:nvPr>
         </p:nvSpPr>
         <p:spPr/>
@@ -4132,825 +4039,9 @@
             <a:fld id="{2C54C99C-CE89-4C76-8DB1-E15D6EAB6684}" type="slidenum">
               <a:rPr lang="en-US" smtClean="0"/>
               <a:pPr/>
-              <a:t>3</a:t>
+              <a:t>11</a:t>
             </a:fld>
-            <a:endParaRPr lang="en-US"/>
-          </a:p>
-        </p:txBody>
-      </p:sp>
-      <p:pic>
-        <p:nvPicPr>
-          <p:cNvPr id="2052" name="Picture 4" descr="centralized-vs-distributed"/>
-          <p:cNvPicPr>
-            <a:picLocks noGrp="1" noChangeAspect="1" noChangeArrowheads="1"/>
-          </p:cNvPicPr>
-          <p:nvPr>
-            <p:ph idx="1"/>
-          </p:nvPr>
-        </p:nvPicPr>
-        <p:blipFill>
-          <a:blip r:embed="rId2">
-            <a:extLst>
-              <a:ext uri="{28A0092B-C50C-407E-A947-70E740481C1C}">
-                <a14:useLocalDpi xmlns:a14="http://schemas.microsoft.com/office/drawing/2010/main" val="0"/>
-              </a:ext>
-            </a:extLst>
-          </a:blip>
-          <a:srcRect/>
-          <a:stretch>
-            <a:fillRect/>
-          </a:stretch>
-        </p:blipFill>
-        <p:spPr bwMode="auto">
-          <a:xfrm>
-            <a:off x="2044342" y="1065213"/>
-            <a:ext cx="5029916" cy="5049837"/>
-          </a:xfrm>
-          <a:prstGeom prst="rect">
-            <a:avLst/>
-          </a:prstGeom>
-          <a:noFill/>
-          <a:extLst>
-            <a:ext uri="{909E8E84-426E-40DD-AFC4-6F175D3DCCD1}">
-              <a14:hiddenFill xmlns:a14="http://schemas.microsoft.com/office/drawing/2010/main">
-                <a:solidFill>
-                  <a:srgbClr val="FFFFFF"/>
-                </a:solidFill>
-              </a14:hiddenFill>
-            </a:ext>
-          </a:extLst>
-        </p:spPr>
-      </p:pic>
-    </p:spTree>
-    <p:extLst>
-      <p:ext uri="{BB962C8B-B14F-4D97-AF65-F5344CB8AC3E}">
-        <p14:creationId xmlns:p14="http://schemas.microsoft.com/office/powerpoint/2010/main" val="2406177149"/>
-      </p:ext>
-    </p:extLst>
-  </p:cSld>
-  <p:clrMapOvr>
-    <a:masterClrMapping/>
-  </p:clrMapOvr>
-  <p:timing>
-    <p:tnLst>
-      <p:par>
-        <p:cTn id="1" dur="indefinite" restart="never" nodeType="tmRoot"/>
-      </p:par>
-    </p:tnLst>
-  </p:timing>
-</p:sld>
-</file>
-
-<file path=ppt/slides/slide4.xml><?xml version="1.0" encoding="utf-8"?>
-<p:sld xmlns:a="http://schemas.openxmlformats.org/drawingml/2006/main" xmlns:r="http://schemas.openxmlformats.org/officeDocument/2006/relationships" xmlns:p="http://schemas.openxmlformats.org/presentationml/2006/main">
-  <p:cSld>
-    <p:spTree>
-      <p:nvGrpSpPr>
-        <p:cNvPr id="1" name=""/>
-        <p:cNvGrpSpPr/>
-        <p:nvPr/>
-      </p:nvGrpSpPr>
-      <p:grpSpPr>
-        <a:xfrm>
-          <a:off x="0" y="0"/>
-          <a:ext cx="0" cy="0"/>
-          <a:chOff x="0" y="0"/>
-          <a:chExt cx="0" cy="0"/>
-        </a:xfrm>
-      </p:grpSpPr>
-      <p:pic>
-        <p:nvPicPr>
-          <p:cNvPr id="3074" name="Picture 2" descr="screenshot"/>
-          <p:cNvPicPr>
-            <a:picLocks noChangeAspect="1" noChangeArrowheads="1"/>
-          </p:cNvPicPr>
-          <p:nvPr/>
-        </p:nvPicPr>
-        <p:blipFill>
-          <a:blip r:embed="rId2">
-            <a:extLst>
-              <a:ext uri="{28A0092B-C50C-407E-A947-70E740481C1C}">
-                <a14:useLocalDpi xmlns:a14="http://schemas.microsoft.com/office/drawing/2010/main" val="0"/>
-              </a:ext>
-            </a:extLst>
-          </a:blip>
-          <a:srcRect/>
-          <a:stretch>
-            <a:fillRect/>
-          </a:stretch>
-        </p:blipFill>
-        <p:spPr bwMode="auto">
-          <a:xfrm>
-            <a:off x="6435927" y="815975"/>
-            <a:ext cx="2708073" cy="2103663"/>
-          </a:xfrm>
-          <a:prstGeom prst="rect">
-            <a:avLst/>
-          </a:prstGeom>
-          <a:noFill/>
-          <a:extLst>
-            <a:ext uri="{909E8E84-426E-40DD-AFC4-6F175D3DCCD1}">
-              <a14:hiddenFill xmlns:a14="http://schemas.microsoft.com/office/drawing/2010/main">
-                <a:solidFill>
-                  <a:srgbClr val="FFFFFF"/>
-                </a:solidFill>
-              </a14:hiddenFill>
-            </a:ext>
-          </a:extLst>
-        </p:spPr>
-      </p:pic>
-      <p:sp>
-        <p:nvSpPr>
-          <p:cNvPr id="2" name="Title 1"/>
-          <p:cNvSpPr>
-            <a:spLocks noGrp="1"/>
-          </p:cNvSpPr>
-          <p:nvPr>
-            <p:ph type="title"/>
-          </p:nvPr>
-        </p:nvSpPr>
-        <p:spPr/>
-        <p:txBody>
-          <a:bodyPr/>
-          <a:lstStyle/>
-          <a:p>
-            <a:r>
-              <a:rPr lang="en-US" dirty="0" smtClean="0"/>
-              <a:t>Why use Distributed?</a:t>
-            </a:r>
-            <a:endParaRPr lang="en-US" dirty="0"/>
-          </a:p>
-        </p:txBody>
-      </p:sp>
-      <p:sp>
-        <p:nvSpPr>
-          <p:cNvPr id="3" name="Content Placeholder 2"/>
-          <p:cNvSpPr>
-            <a:spLocks noGrp="1"/>
-          </p:cNvSpPr>
-          <p:nvPr>
-            <p:ph idx="1"/>
-          </p:nvPr>
-        </p:nvSpPr>
-        <p:spPr/>
-        <p:txBody>
-          <a:bodyPr/>
-          <a:lstStyle/>
-          <a:p>
-            <a:r>
-              <a:rPr lang="en-US" dirty="0" smtClean="0"/>
-              <a:t>Each developer has their own local repository</a:t>
-            </a:r>
-          </a:p>
-          <a:p>
-            <a:pPr lvl="1"/>
-            <a:r>
-              <a:rPr lang="en-US" dirty="0" smtClean="0"/>
-              <a:t>This is separate from their “working copy”</a:t>
-            </a:r>
-          </a:p>
-          <a:p>
-            <a:pPr lvl="1"/>
-            <a:endParaRPr lang="en-US" dirty="0"/>
-          </a:p>
-          <a:p>
-            <a:r>
-              <a:rPr lang="en-US" dirty="0" smtClean="0"/>
-              <a:t>Allows commits off-line</a:t>
-            </a:r>
-          </a:p>
-          <a:p>
-            <a:endParaRPr lang="en-US" dirty="0"/>
-          </a:p>
-          <a:p>
-            <a:r>
-              <a:rPr lang="en-US" dirty="0" smtClean="0"/>
-              <a:t>Can be configured to use a remote “SVN style” repository</a:t>
-            </a:r>
-          </a:p>
-          <a:p>
-            <a:endParaRPr lang="en-US" dirty="0"/>
-          </a:p>
-          <a:p>
-            <a:r>
-              <a:rPr lang="en-US" dirty="0" smtClean="0"/>
-              <a:t>Speed increase for commits, logs, diffs, update, blame</a:t>
-            </a:r>
-          </a:p>
-          <a:p>
-            <a:endParaRPr lang="en-US" dirty="0"/>
-          </a:p>
-          <a:p>
-            <a:r>
-              <a:rPr lang="en-US" dirty="0" smtClean="0"/>
-              <a:t>Complete local back-up</a:t>
-            </a:r>
-          </a:p>
-          <a:p>
-            <a:pPr lvl="1"/>
-            <a:r>
-              <a:rPr lang="en-US" dirty="0" smtClean="0"/>
-              <a:t>hard to lose data</a:t>
-            </a:r>
-          </a:p>
-          <a:p>
-            <a:endParaRPr lang="en-US" dirty="0"/>
-          </a:p>
-          <a:p>
-            <a:r>
-              <a:rPr lang="en-US" dirty="0" smtClean="0"/>
-              <a:t>Can use different workflows</a:t>
-            </a:r>
-          </a:p>
-          <a:p>
-            <a:pPr lvl="1"/>
-            <a:r>
-              <a:rPr lang="en-US" dirty="0" smtClean="0"/>
-              <a:t>E.g. integrator approach</a:t>
-            </a:r>
-          </a:p>
-          <a:p>
-            <a:endParaRPr lang="en-US" dirty="0"/>
-          </a:p>
-        </p:txBody>
-      </p:sp>
-      <p:sp>
-        <p:nvSpPr>
-          <p:cNvPr id="4" name="Slide Number Placeholder 3"/>
-          <p:cNvSpPr>
-            <a:spLocks noGrp="1"/>
-          </p:cNvSpPr>
-          <p:nvPr>
-            <p:ph type="sldNum" sz="quarter" idx="10"/>
-          </p:nvPr>
-        </p:nvSpPr>
-        <p:spPr/>
-        <p:txBody>
-          <a:bodyPr/>
-          <a:lstStyle/>
-          <a:p>
-            <a:fld id="{2C54C99C-CE89-4C76-8DB1-E15D6EAB6684}" type="slidenum">
-              <a:rPr lang="en-US" smtClean="0"/>
-              <a:pPr/>
-              <a:t>4</a:t>
-            </a:fld>
-            <a:endParaRPr lang="en-US"/>
-          </a:p>
-        </p:txBody>
-      </p:sp>
-      <p:pic>
-        <p:nvPicPr>
-          <p:cNvPr id="3076" name="Picture 4" descr="An example distributed workflow involving several Git repositories"/>
-          <p:cNvPicPr>
-            <a:picLocks noChangeAspect="1" noChangeArrowheads="1"/>
-          </p:cNvPicPr>
-          <p:nvPr/>
-        </p:nvPicPr>
-        <p:blipFill>
-          <a:blip r:embed="rId3">
-            <a:extLst>
-              <a:ext uri="{28A0092B-C50C-407E-A947-70E740481C1C}">
-                <a14:useLocalDpi xmlns:a14="http://schemas.microsoft.com/office/drawing/2010/main" val="0"/>
-              </a:ext>
-            </a:extLst>
-          </a:blip>
-          <a:srcRect/>
-          <a:stretch>
-            <a:fillRect/>
-          </a:stretch>
-        </p:blipFill>
-        <p:spPr bwMode="auto">
-          <a:xfrm>
-            <a:off x="5216335" y="4764830"/>
-            <a:ext cx="3876421" cy="1600055"/>
-          </a:xfrm>
-          <a:prstGeom prst="rect">
-            <a:avLst/>
-          </a:prstGeom>
-          <a:noFill/>
-          <a:extLst>
-            <a:ext uri="{909E8E84-426E-40DD-AFC4-6F175D3DCCD1}">
-              <a14:hiddenFill xmlns:a14="http://schemas.microsoft.com/office/drawing/2010/main">
-                <a:solidFill>
-                  <a:srgbClr val="FFFFFF"/>
-                </a:solidFill>
-              </a14:hiddenFill>
-            </a:ext>
-          </a:extLst>
-        </p:spPr>
-      </p:pic>
-    </p:spTree>
-    <p:extLst>
-      <p:ext uri="{BB962C8B-B14F-4D97-AF65-F5344CB8AC3E}">
-        <p14:creationId xmlns:p14="http://schemas.microsoft.com/office/powerpoint/2010/main" val="1417784465"/>
-      </p:ext>
-    </p:extLst>
-  </p:cSld>
-  <p:clrMapOvr>
-    <a:masterClrMapping/>
-  </p:clrMapOvr>
-  <p:timing>
-    <p:tnLst>
-      <p:par>
-        <p:cTn id="1" dur="indefinite" restart="never" nodeType="tmRoot"/>
-      </p:par>
-    </p:tnLst>
-  </p:timing>
-</p:sld>
-</file>
-
-<file path=ppt/slides/slide5.xml><?xml version="1.0" encoding="utf-8"?>
-<p:sld xmlns:a="http://schemas.openxmlformats.org/drawingml/2006/main" xmlns:r="http://schemas.openxmlformats.org/officeDocument/2006/relationships" xmlns:p="http://schemas.openxmlformats.org/presentationml/2006/main">
-  <p:cSld>
-    <p:spTree>
-      <p:nvGrpSpPr>
-        <p:cNvPr id="1" name=""/>
-        <p:cNvGrpSpPr/>
-        <p:nvPr/>
-      </p:nvGrpSpPr>
-      <p:grpSpPr>
-        <a:xfrm>
-          <a:off x="0" y="0"/>
-          <a:ext cx="0" cy="0"/>
-          <a:chOff x="0" y="0"/>
-          <a:chExt cx="0" cy="0"/>
-        </a:xfrm>
-      </p:grpSpPr>
-      <p:sp>
-        <p:nvSpPr>
-          <p:cNvPr id="2" name="Title 1"/>
-          <p:cNvSpPr>
-            <a:spLocks noGrp="1"/>
-          </p:cNvSpPr>
-          <p:nvPr>
-            <p:ph type="title"/>
-          </p:nvPr>
-        </p:nvSpPr>
-        <p:spPr/>
-        <p:txBody>
-          <a:bodyPr/>
-          <a:lstStyle/>
-          <a:p>
-            <a:r>
-              <a:rPr lang="en-US" dirty="0" smtClean="0"/>
-              <a:t>Repository Structure</a:t>
-            </a:r>
-            <a:endParaRPr lang="en-US" dirty="0"/>
-          </a:p>
-        </p:txBody>
-      </p:sp>
-      <p:sp>
-        <p:nvSpPr>
-          <p:cNvPr id="3" name="Content Placeholder 2"/>
-          <p:cNvSpPr>
-            <a:spLocks noGrp="1"/>
-          </p:cNvSpPr>
-          <p:nvPr>
-            <p:ph idx="1"/>
-          </p:nvPr>
-        </p:nvSpPr>
-        <p:spPr/>
-        <p:txBody>
-          <a:bodyPr/>
-          <a:lstStyle/>
-          <a:p>
-            <a:r>
-              <a:rPr lang="en-US" b="1" dirty="0" smtClean="0"/>
-              <a:t>SVN</a:t>
-            </a:r>
-          </a:p>
-          <a:p>
-            <a:pPr lvl="1"/>
-            <a:r>
-              <a:rPr lang="en-US" dirty="0"/>
-              <a:t>t</a:t>
-            </a:r>
-            <a:r>
-              <a:rPr lang="en-US" dirty="0" smtClean="0"/>
-              <a:t>runk</a:t>
-            </a:r>
-          </a:p>
-          <a:p>
-            <a:pPr lvl="1"/>
-            <a:r>
-              <a:rPr lang="en-US" dirty="0" smtClean="0"/>
-              <a:t>branches</a:t>
-            </a:r>
-          </a:p>
-          <a:p>
-            <a:pPr lvl="2"/>
-            <a:r>
-              <a:rPr lang="en-US" dirty="0" smtClean="0"/>
-              <a:t>A copy of the project in another folder</a:t>
-            </a:r>
-          </a:p>
-          <a:p>
-            <a:pPr lvl="1"/>
-            <a:r>
-              <a:rPr lang="en-US" dirty="0" smtClean="0"/>
-              <a:t>tags</a:t>
-            </a:r>
-            <a:endParaRPr lang="en-US" dirty="0"/>
-          </a:p>
-          <a:p>
-            <a:r>
-              <a:rPr lang="en-US" dirty="0" smtClean="0"/>
-              <a:t>URLs are used to point to all locations.</a:t>
-            </a:r>
-          </a:p>
-          <a:p>
-            <a:endParaRPr lang="en-US" dirty="0"/>
-          </a:p>
-          <a:p>
-            <a:r>
-              <a:rPr lang="en-US" b="1" dirty="0" err="1" smtClean="0"/>
-              <a:t>Git</a:t>
-            </a:r>
-            <a:endParaRPr lang="en-US" b="1" dirty="0" smtClean="0"/>
-          </a:p>
-          <a:p>
-            <a:pPr lvl="1"/>
-            <a:r>
-              <a:rPr lang="en-US" dirty="0" smtClean="0"/>
-              <a:t>Consist of a single “.</a:t>
-            </a:r>
-            <a:r>
-              <a:rPr lang="en-US" dirty="0" err="1" smtClean="0"/>
-              <a:t>git</a:t>
-            </a:r>
-            <a:r>
-              <a:rPr lang="en-US" dirty="0" smtClean="0"/>
-              <a:t>” folder</a:t>
-            </a:r>
-          </a:p>
-          <a:p>
-            <a:pPr lvl="2"/>
-            <a:r>
-              <a:rPr lang="en-US" dirty="0" smtClean="0"/>
-              <a:t>Located in root of a project</a:t>
-            </a:r>
-          </a:p>
-          <a:p>
-            <a:pPr lvl="1"/>
-            <a:r>
-              <a:rPr lang="en-US" dirty="0" smtClean="0"/>
-              <a:t>Branches/tags are addressed via commands</a:t>
-            </a:r>
-          </a:p>
-          <a:p>
-            <a:pPr lvl="2"/>
-            <a:r>
-              <a:rPr lang="en-US" dirty="0" smtClean="0"/>
-              <a:t>A pointer to a certain revision</a:t>
-            </a:r>
-          </a:p>
-          <a:p>
-            <a:r>
-              <a:rPr lang="en-US" dirty="0" smtClean="0"/>
-              <a:t>URL only points to the location of the repository</a:t>
-            </a:r>
-          </a:p>
-        </p:txBody>
-      </p:sp>
-      <p:sp>
-        <p:nvSpPr>
-          <p:cNvPr id="4" name="Slide Number Placeholder 3"/>
-          <p:cNvSpPr>
-            <a:spLocks noGrp="1"/>
-          </p:cNvSpPr>
-          <p:nvPr>
-            <p:ph type="sldNum" sz="quarter" idx="10"/>
-          </p:nvPr>
-        </p:nvSpPr>
-        <p:spPr/>
-        <p:txBody>
-          <a:bodyPr/>
-          <a:lstStyle/>
-          <a:p>
-            <a:fld id="{2C54C99C-CE89-4C76-8DB1-E15D6EAB6684}" type="slidenum">
-              <a:rPr lang="en-US" smtClean="0"/>
-              <a:pPr/>
-              <a:t>5</a:t>
-            </a:fld>
-            <a:endParaRPr lang="en-US"/>
-          </a:p>
-        </p:txBody>
-      </p:sp>
-      <p:pic>
-        <p:nvPicPr>
-          <p:cNvPr id="5" name="Picture 4"/>
-          <p:cNvPicPr>
-            <a:picLocks noChangeAspect="1"/>
-          </p:cNvPicPr>
-          <p:nvPr/>
-        </p:nvPicPr>
-        <p:blipFill>
-          <a:blip r:embed="rId2"/>
-          <a:stretch>
-            <a:fillRect/>
-          </a:stretch>
-        </p:blipFill>
-        <p:spPr>
-          <a:xfrm>
-            <a:off x="6520684" y="815975"/>
-            <a:ext cx="2623316" cy="2559849"/>
-          </a:xfrm>
-          <a:prstGeom prst="rect">
-            <a:avLst/>
-          </a:prstGeom>
-        </p:spPr>
-      </p:pic>
-      <p:pic>
-        <p:nvPicPr>
-          <p:cNvPr id="6" name="Picture 5"/>
-          <p:cNvPicPr>
-            <a:picLocks noChangeAspect="1"/>
-          </p:cNvPicPr>
-          <p:nvPr/>
-        </p:nvPicPr>
-        <p:blipFill>
-          <a:blip r:embed="rId3"/>
-          <a:stretch>
-            <a:fillRect/>
-          </a:stretch>
-        </p:blipFill>
-        <p:spPr>
-          <a:xfrm>
-            <a:off x="6650078" y="3933825"/>
-            <a:ext cx="2398422" cy="2535174"/>
-          </a:xfrm>
-          <a:prstGeom prst="rect">
-            <a:avLst/>
-          </a:prstGeom>
-        </p:spPr>
-      </p:pic>
-    </p:spTree>
-    <p:extLst>
-      <p:ext uri="{BB962C8B-B14F-4D97-AF65-F5344CB8AC3E}">
-        <p14:creationId xmlns:p14="http://schemas.microsoft.com/office/powerpoint/2010/main" val="1791898961"/>
-      </p:ext>
-    </p:extLst>
-  </p:cSld>
-  <p:clrMapOvr>
-    <a:masterClrMapping/>
-  </p:clrMapOvr>
-  <p:timing>
-    <p:tnLst>
-      <p:par>
-        <p:cTn id="1" dur="indefinite" restart="never" nodeType="tmRoot"/>
-      </p:par>
-    </p:tnLst>
-  </p:timing>
-</p:sld>
-</file>
-
-<file path=ppt/slides/slide6.xml><?xml version="1.0" encoding="utf-8"?>
-<p:sld xmlns:a="http://schemas.openxmlformats.org/drawingml/2006/main" xmlns:r="http://schemas.openxmlformats.org/officeDocument/2006/relationships" xmlns:p="http://schemas.openxmlformats.org/presentationml/2006/main">
-  <p:cSld>
-    <p:spTree>
-      <p:nvGrpSpPr>
-        <p:cNvPr id="1" name=""/>
-        <p:cNvGrpSpPr/>
-        <p:nvPr/>
-      </p:nvGrpSpPr>
-      <p:grpSpPr>
-        <a:xfrm>
-          <a:off x="0" y="0"/>
-          <a:ext cx="0" cy="0"/>
-          <a:chOff x="0" y="0"/>
-          <a:chExt cx="0" cy="0"/>
-        </a:xfrm>
-      </p:grpSpPr>
-      <p:sp>
-        <p:nvSpPr>
-          <p:cNvPr id="2" name="Title 1"/>
-          <p:cNvSpPr>
-            <a:spLocks noGrp="1"/>
-          </p:cNvSpPr>
-          <p:nvPr>
-            <p:ph type="title"/>
-          </p:nvPr>
-        </p:nvSpPr>
-        <p:spPr/>
-        <p:txBody>
-          <a:bodyPr/>
-          <a:lstStyle/>
-          <a:p>
-            <a:r>
-              <a:rPr lang="en-US" dirty="0" smtClean="0"/>
-              <a:t>Committing</a:t>
-            </a:r>
-            <a:endParaRPr lang="en-US" dirty="0"/>
-          </a:p>
-        </p:txBody>
-      </p:sp>
-      <p:sp>
-        <p:nvSpPr>
-          <p:cNvPr id="3" name="Content Placeholder 2"/>
-          <p:cNvSpPr>
-            <a:spLocks noGrp="1"/>
-          </p:cNvSpPr>
-          <p:nvPr>
-            <p:ph idx="1"/>
-          </p:nvPr>
-        </p:nvSpPr>
-        <p:spPr/>
-        <p:txBody>
-          <a:bodyPr/>
-          <a:lstStyle/>
-          <a:p>
-            <a:r>
-              <a:rPr lang="en-US" b="1" dirty="0" smtClean="0"/>
-              <a:t>SVN</a:t>
-            </a:r>
-          </a:p>
-          <a:p>
-            <a:pPr lvl="1"/>
-            <a:r>
-              <a:rPr lang="en-US" dirty="0" smtClean="0"/>
-              <a:t>Can only commit when connected to central repository</a:t>
-            </a:r>
-          </a:p>
-          <a:p>
-            <a:pPr lvl="1"/>
-            <a:r>
-              <a:rPr lang="en-US" dirty="0" smtClean="0"/>
-              <a:t>Commit gets instantly transferred to central repository</a:t>
-            </a:r>
-          </a:p>
-          <a:p>
-            <a:pPr lvl="1"/>
-            <a:r>
-              <a:rPr lang="en-US" dirty="0" smtClean="0"/>
-              <a:t>Commit gets assigned an ascending revision number</a:t>
-            </a:r>
-          </a:p>
-          <a:p>
-            <a:pPr lvl="1"/>
-            <a:endParaRPr lang="en-US" dirty="0"/>
-          </a:p>
-          <a:p>
-            <a:r>
-              <a:rPr lang="en-US" b="1" dirty="0" err="1" smtClean="0"/>
-              <a:t>Git</a:t>
-            </a:r>
-            <a:endParaRPr lang="en-US" b="1" dirty="0" smtClean="0"/>
-          </a:p>
-          <a:p>
-            <a:pPr lvl="1"/>
-            <a:r>
-              <a:rPr lang="en-US" dirty="0" smtClean="0"/>
-              <a:t>Can commit to local repository whenever</a:t>
-            </a:r>
-          </a:p>
-          <a:p>
-            <a:pPr lvl="1"/>
-            <a:r>
-              <a:rPr lang="en-US" dirty="0" smtClean="0"/>
-              <a:t>Use “push” command to send commit to another repository</a:t>
-            </a:r>
-          </a:p>
-          <a:p>
-            <a:pPr lvl="1"/>
-            <a:r>
-              <a:rPr lang="en-US" dirty="0" smtClean="0"/>
-              <a:t>Commit gets assigned a SHA-1 id</a:t>
-            </a:r>
-          </a:p>
-          <a:p>
-            <a:pPr lvl="2"/>
-            <a:r>
-              <a:rPr lang="en-US" dirty="0" smtClean="0"/>
-              <a:t>Used for data integrity</a:t>
-            </a:r>
-          </a:p>
-          <a:p>
-            <a:pPr lvl="2"/>
-            <a:r>
-              <a:rPr lang="en-US" dirty="0" smtClean="0"/>
-              <a:t>Commit id will change if the commit or history changes</a:t>
-            </a:r>
-          </a:p>
-          <a:p>
-            <a:pPr lvl="1"/>
-            <a:r>
-              <a:rPr lang="en-US" dirty="0" smtClean="0"/>
-              <a:t>Unique “staging area” which allows part of files to be committed</a:t>
-            </a:r>
-          </a:p>
-          <a:p>
-            <a:pPr marL="342900" lvl="1" indent="0">
-              <a:buNone/>
-            </a:pPr>
-            <a:endParaRPr lang="en-US" dirty="0"/>
-          </a:p>
-        </p:txBody>
-      </p:sp>
-      <p:sp>
-        <p:nvSpPr>
-          <p:cNvPr id="4" name="Slide Number Placeholder 3"/>
-          <p:cNvSpPr>
-            <a:spLocks noGrp="1"/>
-          </p:cNvSpPr>
-          <p:nvPr>
-            <p:ph type="sldNum" sz="quarter" idx="10"/>
-          </p:nvPr>
-        </p:nvSpPr>
-        <p:spPr/>
-        <p:txBody>
-          <a:bodyPr/>
-          <a:lstStyle/>
-          <a:p>
-            <a:fld id="{2C54C99C-CE89-4C76-8DB1-E15D6EAB6684}" type="slidenum">
-              <a:rPr lang="en-US" smtClean="0"/>
-              <a:pPr/>
-              <a:t>6</a:t>
-            </a:fld>
-            <a:endParaRPr lang="en-US"/>
-          </a:p>
-        </p:txBody>
-      </p:sp>
-    </p:spTree>
-    <p:extLst>
-      <p:ext uri="{BB962C8B-B14F-4D97-AF65-F5344CB8AC3E}">
-        <p14:creationId xmlns:p14="http://schemas.microsoft.com/office/powerpoint/2010/main" val="1921723073"/>
-      </p:ext>
-    </p:extLst>
-  </p:cSld>
-  <p:clrMapOvr>
-    <a:masterClrMapping/>
-  </p:clrMapOvr>
-  <p:timing>
-    <p:tnLst>
-      <p:par>
-        <p:cTn id="1" dur="indefinite" restart="never" nodeType="tmRoot"/>
-      </p:par>
-    </p:tnLst>
-  </p:timing>
-</p:sld>
-</file>
-
-<file path=ppt/slides/slide7.xml><?xml version="1.0" encoding="utf-8"?>
-<p:sld xmlns:a="http://schemas.openxmlformats.org/drawingml/2006/main" xmlns:r="http://schemas.openxmlformats.org/officeDocument/2006/relationships" xmlns:p="http://schemas.openxmlformats.org/presentationml/2006/main">
-  <p:cSld>
-    <p:spTree>
-      <p:nvGrpSpPr>
-        <p:cNvPr id="1" name=""/>
-        <p:cNvGrpSpPr/>
-        <p:nvPr/>
-      </p:nvGrpSpPr>
-      <p:grpSpPr>
-        <a:xfrm>
-          <a:off x="0" y="0"/>
-          <a:ext cx="0" cy="0"/>
-          <a:chOff x="0" y="0"/>
-          <a:chExt cx="0" cy="0"/>
-        </a:xfrm>
-      </p:grpSpPr>
-      <p:sp>
-        <p:nvSpPr>
-          <p:cNvPr id="2" name="Title 1"/>
-          <p:cNvSpPr>
-            <a:spLocks noGrp="1"/>
-          </p:cNvSpPr>
-          <p:nvPr>
-            <p:ph type="title"/>
-          </p:nvPr>
-        </p:nvSpPr>
-        <p:spPr/>
-        <p:txBody>
-          <a:bodyPr/>
-          <a:lstStyle/>
-          <a:p>
-            <a:r>
-              <a:rPr lang="en-US" dirty="0" smtClean="0"/>
-              <a:t>Commands</a:t>
-            </a:r>
-            <a:endParaRPr lang="en-US" dirty="0"/>
-          </a:p>
-        </p:txBody>
-      </p:sp>
-      <p:sp>
-        <p:nvSpPr>
-          <p:cNvPr id="3" name="Slide Number Placeholder 2"/>
-          <p:cNvSpPr>
-            <a:spLocks noGrp="1"/>
-          </p:cNvSpPr>
-          <p:nvPr>
-            <p:ph type="sldNum" sz="quarter" idx="4"/>
-          </p:nvPr>
-        </p:nvSpPr>
-        <p:spPr/>
-        <p:txBody>
-          <a:bodyPr/>
-          <a:lstStyle/>
-          <a:p>
-            <a:fld id="{2C54C99C-CE89-4C76-8DB1-E15D6EAB6684}" type="slidenum">
-              <a:rPr lang="en-US" smtClean="0"/>
-              <a:pPr/>
-              <a:t>7</a:t>
-            </a:fld>
-            <a:endParaRPr lang="en-US"/>
+            <a:endParaRPr lang="en-US" dirty="0"/>
           </a:p>
         </p:txBody>
       </p:sp>
@@ -5017,7 +4108,7 @@
 </p:sld>
 </file>
 
-<file path=ppt/slides/slide8.xml><?xml version="1.0" encoding="utf-8"?>
+<file path=ppt/slides/slide12.xml><?xml version="1.0" encoding="utf-8"?>
 <p:sld xmlns:a="http://schemas.openxmlformats.org/drawingml/2006/main" xmlns:r="http://schemas.openxmlformats.org/officeDocument/2006/relationships" xmlns:p="http://schemas.openxmlformats.org/presentationml/2006/main">
   <p:cSld>
     <p:spTree>
@@ -5067,7 +4158,7 @@
             <p:ph idx="1"/>
             <p:extLst>
               <p:ext uri="{D42A27DB-BD31-4B8C-83A1-F6EECF244321}">
-                <p14:modId xmlns:p14="http://schemas.microsoft.com/office/powerpoint/2010/main" val="1234133507"/>
+                <p14:modId xmlns:p14="http://schemas.microsoft.com/office/powerpoint/2010/main" val="2768225142"/>
               </p:ext>
             </p:extLst>
           </p:nvPr>
@@ -5166,15 +4257,7 @@
                       </a:r>
                       <a:r>
                         <a:rPr lang="en-US" baseline="0" dirty="0" smtClean="0"/>
-                        <a:t> disk usage – (E.g. Mozilla project 30x smaller using </a:t>
-                      </a:r>
-                      <a:r>
-                        <a:rPr lang="en-US" baseline="0" dirty="0" err="1" smtClean="0"/>
-                        <a:t>git</a:t>
-                      </a:r>
-                      <a:r>
-                        <a:rPr lang="en-US" baseline="0" dirty="0" smtClean="0"/>
-                        <a:t>)</a:t>
+                        <a:t> disk usage – (E.g. Mozilla project 30x smaller using git)</a:t>
                       </a:r>
                       <a:endParaRPr lang="en-US" dirty="0"/>
                     </a:p>
@@ -5192,23 +4275,7 @@
                       </a:r>
                       <a:r>
                         <a:rPr lang="en-US" baseline="0" dirty="0" smtClean="0"/>
-                        <a:t> UI available.  </a:t>
-                      </a:r>
-                      <a:r>
-                        <a:rPr lang="en-US" baseline="0" dirty="0" err="1" smtClean="0"/>
-                        <a:t>TortoiseGit</a:t>
-                      </a:r>
-                      <a:r>
-                        <a:rPr lang="en-US" baseline="0" dirty="0" smtClean="0"/>
-                        <a:t> was recently released as a port of </a:t>
-                      </a:r>
-                      <a:r>
-                        <a:rPr lang="en-US" baseline="0" dirty="0" err="1" smtClean="0"/>
-                        <a:t>TortoiseSVN</a:t>
-                      </a:r>
-                      <a:r>
-                        <a:rPr lang="en-US" baseline="0" dirty="0" smtClean="0"/>
-                        <a:t>.</a:t>
+                        <a:t> UI available.  TortoiseGit was recently released as a port of TortoiseSVN.</a:t>
                       </a:r>
                       <a:endParaRPr lang="en-US" dirty="0"/>
                     </a:p>
@@ -5311,7 +4378,15 @@
                     <a:bodyPr/>
                     <a:lstStyle/>
                     <a:p>
-                      <a:endParaRPr lang="en-US"/>
+                      <a:r>
+                        <a:rPr lang="en-US" dirty="0" smtClean="0"/>
+                        <a:t>No inherent locking ability</a:t>
+                      </a:r>
+                      <a:r>
+                        <a:rPr lang="en-US" baseline="0" dirty="0" smtClean="0"/>
+                        <a:t> </a:t>
+                      </a:r>
+                      <a:endParaRPr lang="en-US" dirty="0"/>
                     </a:p>
                   </a:txBody>
                   <a:tcPr/>
@@ -5353,6 +4428,14 @@
                     <a:bodyPr/>
                     <a:lstStyle/>
                     <a:p>
+                      <a:r>
+                        <a:rPr lang="en-US" dirty="0" smtClean="0"/>
+                        <a:t>Retain history when</a:t>
+                      </a:r>
+                      <a:r>
+                        <a:rPr lang="en-US" baseline="0" dirty="0" smtClean="0"/>
+                        <a:t> importing SOUP</a:t>
+                      </a:r>
                       <a:endParaRPr lang="en-US" dirty="0"/>
                     </a:p>
                   </a:txBody>
@@ -5391,9 +4474,9 @@
             <a:fld id="{2C54C99C-CE89-4C76-8DB1-E15D6EAB6684}" type="slidenum">
               <a:rPr lang="en-US" smtClean="0"/>
               <a:pPr/>
-              <a:t>8</a:t>
+              <a:t>12</a:t>
             </a:fld>
-            <a:endParaRPr lang="en-US"/>
+            <a:endParaRPr lang="en-US" dirty="0"/>
           </a:p>
         </p:txBody>
       </p:sp>
@@ -5417,6 +4500,1385 @@
 </p:sld>
 </file>
 
+<file path=ppt/slides/slide13.xml><?xml version="1.0" encoding="utf-8"?>
+<p:sld xmlns:a="http://schemas.openxmlformats.org/drawingml/2006/main" xmlns:r="http://schemas.openxmlformats.org/officeDocument/2006/relationships" xmlns:p="http://schemas.openxmlformats.org/presentationml/2006/main">
+  <p:cSld>
+    <p:spTree>
+      <p:nvGrpSpPr>
+        <p:cNvPr id="1" name=""/>
+        <p:cNvGrpSpPr/>
+        <p:nvPr/>
+      </p:nvGrpSpPr>
+      <p:grpSpPr>
+        <a:xfrm>
+          <a:off x="0" y="0"/>
+          <a:ext cx="0" cy="0"/>
+          <a:chOff x="0" y="0"/>
+          <a:chExt cx="0" cy="0"/>
+        </a:xfrm>
+      </p:grpSpPr>
+      <p:sp>
+        <p:nvSpPr>
+          <p:cNvPr id="2" name="Title 1"/>
+          <p:cNvSpPr>
+            <a:spLocks noGrp="1"/>
+          </p:cNvSpPr>
+          <p:nvPr>
+            <p:ph type="ctrTitle"/>
+          </p:nvPr>
+        </p:nvSpPr>
+        <p:spPr/>
+        <p:txBody>
+          <a:bodyPr/>
+          <a:lstStyle/>
+          <a:p>
+            <a:r>
+              <a:rPr lang="en-US" dirty="0" smtClean="0"/>
+              <a:t>Questions?</a:t>
+            </a:r>
+            <a:endParaRPr lang="en-US" dirty="0"/>
+          </a:p>
+        </p:txBody>
+      </p:sp>
+    </p:spTree>
+    <p:extLst>
+      <p:ext uri="{BB962C8B-B14F-4D97-AF65-F5344CB8AC3E}">
+        <p14:creationId xmlns:p14="http://schemas.microsoft.com/office/powerpoint/2010/main" val="3977825847"/>
+      </p:ext>
+    </p:extLst>
+  </p:cSld>
+  <p:clrMapOvr>
+    <a:masterClrMapping/>
+  </p:clrMapOvr>
+  <p:timing>
+    <p:tnLst>
+      <p:par>
+        <p:cTn id="1" dur="indefinite" restart="never" nodeType="tmRoot"/>
+      </p:par>
+    </p:tnLst>
+  </p:timing>
+</p:sld>
+</file>
+
+<file path=ppt/slides/slide2.xml><?xml version="1.0" encoding="utf-8"?>
+<p:sld xmlns:a="http://schemas.openxmlformats.org/drawingml/2006/main" xmlns:r="http://schemas.openxmlformats.org/officeDocument/2006/relationships" xmlns:p="http://schemas.openxmlformats.org/presentationml/2006/main">
+  <p:cSld>
+    <p:spTree>
+      <p:nvGrpSpPr>
+        <p:cNvPr id="1" name=""/>
+        <p:cNvGrpSpPr/>
+        <p:nvPr/>
+      </p:nvGrpSpPr>
+      <p:grpSpPr>
+        <a:xfrm>
+          <a:off x="0" y="0"/>
+          <a:ext cx="0" cy="0"/>
+          <a:chOff x="0" y="0"/>
+          <a:chExt cx="0" cy="0"/>
+        </a:xfrm>
+      </p:grpSpPr>
+      <p:sp>
+        <p:nvSpPr>
+          <p:cNvPr id="2" name="Title 1"/>
+          <p:cNvSpPr>
+            <a:spLocks noGrp="1"/>
+          </p:cNvSpPr>
+          <p:nvPr>
+            <p:ph type="title"/>
+          </p:nvPr>
+        </p:nvSpPr>
+        <p:spPr/>
+        <p:txBody>
+          <a:bodyPr/>
+          <a:lstStyle/>
+          <a:p>
+            <a:r>
+              <a:rPr lang="en-US" dirty="0" smtClean="0"/>
+              <a:t>Background</a:t>
+            </a:r>
+            <a:endParaRPr lang="en-US" dirty="0"/>
+          </a:p>
+        </p:txBody>
+      </p:sp>
+      <p:sp>
+        <p:nvSpPr>
+          <p:cNvPr id="3" name="Content Placeholder 2"/>
+          <p:cNvSpPr>
+            <a:spLocks noGrp="1"/>
+          </p:cNvSpPr>
+          <p:nvPr>
+            <p:ph idx="1"/>
+          </p:nvPr>
+        </p:nvSpPr>
+        <p:spPr/>
+        <p:txBody>
+          <a:bodyPr/>
+          <a:lstStyle/>
+          <a:p>
+            <a:r>
+              <a:rPr lang="en-US" dirty="0" smtClean="0">
+                <a:hlinkClick r:id="rId2"/>
+              </a:rPr>
+              <a:t>CIF-348 Version Control System Assessment</a:t>
+            </a:r>
+            <a:endParaRPr lang="en-US" dirty="0" smtClean="0"/>
+          </a:p>
+          <a:p>
+            <a:pPr marL="1022350" lvl="1" indent="-342900">
+              <a:buFont typeface="Arial" panose="020B0604020202020204" pitchFamily="34" charset="0"/>
+              <a:buChar char="•"/>
+            </a:pPr>
+            <a:r>
+              <a:rPr lang="en-US" dirty="0" smtClean="0"/>
+              <a:t>Evaluating Git as a potential replacement / supplement to SVN</a:t>
+            </a:r>
+          </a:p>
+          <a:p>
+            <a:pPr>
+              <a:buNone/>
+            </a:pPr>
+            <a:endParaRPr lang="en-US" dirty="0"/>
+          </a:p>
+          <a:p>
+            <a:endParaRPr lang="en-US" dirty="0"/>
+          </a:p>
+          <a:p>
+            <a:r>
+              <a:rPr lang="en-US" dirty="0" smtClean="0"/>
+              <a:t>Medtronic BluLite</a:t>
+            </a:r>
+          </a:p>
+          <a:p>
+            <a:pPr marL="1022350" lvl="1" indent="-342900">
+              <a:buFont typeface="Arial" panose="020B0604020202020204" pitchFamily="34" charset="0"/>
+              <a:buChar char="•"/>
+            </a:pPr>
+            <a:r>
+              <a:rPr lang="en-US" dirty="0" smtClean="0"/>
+              <a:t>Android OS development</a:t>
+            </a:r>
+          </a:p>
+          <a:p>
+            <a:pPr marL="1022350" lvl="1" indent="-342900">
+              <a:buFont typeface="Arial" panose="020B0604020202020204" pitchFamily="34" charset="0"/>
+              <a:buChar char="•"/>
+            </a:pPr>
+            <a:r>
+              <a:rPr lang="en-US" dirty="0" smtClean="0"/>
+              <a:t>Customer specifically requested Git</a:t>
+            </a:r>
+          </a:p>
+          <a:p>
+            <a:pPr marL="1022350" lvl="1" indent="-342900">
+              <a:buFont typeface="Arial" panose="020B0604020202020204" pitchFamily="34" charset="0"/>
+              <a:buChar char="•"/>
+            </a:pPr>
+            <a:r>
+              <a:rPr lang="en-US" dirty="0" smtClean="0"/>
+              <a:t>Used Cloud implementation (GitLab and AWS CodeCommit)</a:t>
+            </a:r>
+            <a:endParaRPr lang="en-US" dirty="0"/>
+          </a:p>
+        </p:txBody>
+      </p:sp>
+      <p:sp>
+        <p:nvSpPr>
+          <p:cNvPr id="4" name="Slide Number Placeholder 3"/>
+          <p:cNvSpPr>
+            <a:spLocks noGrp="1"/>
+          </p:cNvSpPr>
+          <p:nvPr>
+            <p:ph type="sldNum" sz="quarter" idx="10"/>
+          </p:nvPr>
+        </p:nvSpPr>
+        <p:spPr/>
+        <p:txBody>
+          <a:bodyPr/>
+          <a:lstStyle/>
+          <a:p>
+            <a:fld id="{2C54C99C-CE89-4C76-8DB1-E15D6EAB6684}" type="slidenum">
+              <a:rPr lang="en-US" smtClean="0"/>
+              <a:pPr/>
+              <a:t>2</a:t>
+            </a:fld>
+            <a:endParaRPr lang="en-US" dirty="0"/>
+          </a:p>
+        </p:txBody>
+      </p:sp>
+    </p:spTree>
+    <p:extLst>
+      <p:ext uri="{BB962C8B-B14F-4D97-AF65-F5344CB8AC3E}">
+        <p14:creationId xmlns:p14="http://schemas.microsoft.com/office/powerpoint/2010/main" val="357978637"/>
+      </p:ext>
+    </p:extLst>
+  </p:cSld>
+  <p:clrMapOvr>
+    <a:masterClrMapping/>
+  </p:clrMapOvr>
+  <p:timing>
+    <p:tnLst>
+      <p:par>
+        <p:cTn id="1" dur="indefinite" restart="never" nodeType="tmRoot"/>
+      </p:par>
+    </p:tnLst>
+  </p:timing>
+</p:sld>
+</file>
+
+<file path=ppt/slides/slide3.xml><?xml version="1.0" encoding="utf-8"?>
+<p:sld xmlns:a="http://schemas.openxmlformats.org/drawingml/2006/main" xmlns:r="http://schemas.openxmlformats.org/officeDocument/2006/relationships" xmlns:p="http://schemas.openxmlformats.org/presentationml/2006/main">
+  <p:cSld>
+    <p:spTree>
+      <p:nvGrpSpPr>
+        <p:cNvPr id="1" name=""/>
+        <p:cNvGrpSpPr/>
+        <p:nvPr/>
+      </p:nvGrpSpPr>
+      <p:grpSpPr>
+        <a:xfrm>
+          <a:off x="0" y="0"/>
+          <a:ext cx="0" cy="0"/>
+          <a:chOff x="0" y="0"/>
+          <a:chExt cx="0" cy="0"/>
+        </a:xfrm>
+      </p:grpSpPr>
+      <p:sp>
+        <p:nvSpPr>
+          <p:cNvPr id="2" name="Title 1"/>
+          <p:cNvSpPr>
+            <a:spLocks noGrp="1"/>
+          </p:cNvSpPr>
+          <p:nvPr>
+            <p:ph type="title"/>
+          </p:nvPr>
+        </p:nvSpPr>
+        <p:spPr/>
+        <p:txBody>
+          <a:bodyPr/>
+          <a:lstStyle/>
+          <a:p>
+            <a:r>
+              <a:rPr lang="en-US" dirty="0" smtClean="0"/>
+              <a:t>Git</a:t>
+            </a:r>
+            <a:endParaRPr lang="en-US" dirty="0"/>
+          </a:p>
+        </p:txBody>
+      </p:sp>
+      <p:sp>
+        <p:nvSpPr>
+          <p:cNvPr id="3" name="Content Placeholder 2"/>
+          <p:cNvSpPr>
+            <a:spLocks noGrp="1"/>
+          </p:cNvSpPr>
+          <p:nvPr>
+            <p:ph idx="1"/>
+          </p:nvPr>
+        </p:nvSpPr>
+        <p:spPr/>
+        <p:txBody>
+          <a:bodyPr/>
+          <a:lstStyle/>
+          <a:p>
+            <a:r>
+              <a:rPr lang="en-US" dirty="0" smtClean="0"/>
+              <a:t>Open source distributed revision control system</a:t>
+            </a:r>
+          </a:p>
+          <a:p>
+            <a:endParaRPr lang="en-US" dirty="0"/>
+          </a:p>
+          <a:p>
+            <a:r>
+              <a:rPr lang="en-US" dirty="0" smtClean="0"/>
+              <a:t>Created by Linus Torvalds and other Linux kernel developers</a:t>
+            </a:r>
+          </a:p>
+          <a:p>
+            <a:endParaRPr lang="en-US" dirty="0"/>
+          </a:p>
+          <a:p>
+            <a:r>
+              <a:rPr lang="en-US" dirty="0" smtClean="0"/>
+              <a:t>Launched in </a:t>
+            </a:r>
+            <a:r>
+              <a:rPr lang="en-US" dirty="0" smtClean="0"/>
+              <a:t>2005</a:t>
+            </a:r>
+          </a:p>
+          <a:p>
+            <a:endParaRPr lang="en-US" dirty="0"/>
+          </a:p>
+          <a:p>
+            <a:r>
+              <a:rPr lang="en-US" dirty="0" smtClean="0"/>
+              <a:t>Replaced BitKeeper as SCM system for the Linux kernel</a:t>
+            </a:r>
+          </a:p>
+          <a:p>
+            <a:endParaRPr lang="en-US" dirty="0"/>
+          </a:p>
+        </p:txBody>
+      </p:sp>
+      <p:sp>
+        <p:nvSpPr>
+          <p:cNvPr id="4" name="Slide Number Placeholder 3"/>
+          <p:cNvSpPr>
+            <a:spLocks noGrp="1"/>
+          </p:cNvSpPr>
+          <p:nvPr>
+            <p:ph type="sldNum" sz="quarter" idx="10"/>
+          </p:nvPr>
+        </p:nvSpPr>
+        <p:spPr/>
+        <p:txBody>
+          <a:bodyPr/>
+          <a:lstStyle/>
+          <a:p>
+            <a:fld id="{2C54C99C-CE89-4C76-8DB1-E15D6EAB6684}" type="slidenum">
+              <a:rPr lang="en-US" smtClean="0"/>
+              <a:pPr/>
+              <a:t>3</a:t>
+            </a:fld>
+            <a:endParaRPr lang="en-US" dirty="0"/>
+          </a:p>
+        </p:txBody>
+      </p:sp>
+      <p:pic>
+        <p:nvPicPr>
+          <p:cNvPr id="1028" name="Picture 4" descr="https://git-scm.com/images/logo@2x.png"/>
+          <p:cNvPicPr>
+            <a:picLocks noChangeAspect="1" noChangeArrowheads="1"/>
+          </p:cNvPicPr>
+          <p:nvPr/>
+        </p:nvPicPr>
+        <p:blipFill>
+          <a:blip r:embed="rId2">
+            <a:extLst>
+              <a:ext uri="{28A0092B-C50C-407E-A947-70E740481C1C}">
+                <a14:useLocalDpi xmlns:a14="http://schemas.microsoft.com/office/drawing/2010/main" val="0"/>
+              </a:ext>
+            </a:extLst>
+          </a:blip>
+          <a:srcRect/>
+          <a:stretch>
+            <a:fillRect/>
+          </a:stretch>
+        </p:blipFill>
+        <p:spPr bwMode="auto">
+          <a:xfrm>
+            <a:off x="6629527" y="5239492"/>
+            <a:ext cx="2095500" cy="876300"/>
+          </a:xfrm>
+          <a:prstGeom prst="rect">
+            <a:avLst/>
+          </a:prstGeom>
+          <a:noFill/>
+          <a:extLst>
+            <a:ext uri="{909E8E84-426E-40DD-AFC4-6F175D3DCCD1}">
+              <a14:hiddenFill xmlns:a14="http://schemas.microsoft.com/office/drawing/2010/main">
+                <a:solidFill>
+                  <a:srgbClr val="FFFFFF"/>
+                </a:solidFill>
+              </a14:hiddenFill>
+            </a:ext>
+          </a:extLst>
+        </p:spPr>
+      </p:pic>
+    </p:spTree>
+    <p:extLst>
+      <p:ext uri="{BB962C8B-B14F-4D97-AF65-F5344CB8AC3E}">
+        <p14:creationId xmlns:p14="http://schemas.microsoft.com/office/powerpoint/2010/main" val="2450265454"/>
+      </p:ext>
+    </p:extLst>
+  </p:cSld>
+  <p:clrMapOvr>
+    <a:masterClrMapping/>
+  </p:clrMapOvr>
+  <p:timing>
+    <p:tnLst>
+      <p:par>
+        <p:cTn id="1" dur="indefinite" restart="never" nodeType="tmRoot"/>
+      </p:par>
+    </p:tnLst>
+  </p:timing>
+</p:sld>
+</file>
+
+<file path=ppt/slides/slide4.xml><?xml version="1.0" encoding="utf-8"?>
+<p:sld xmlns:a="http://schemas.openxmlformats.org/drawingml/2006/main" xmlns:r="http://schemas.openxmlformats.org/officeDocument/2006/relationships" xmlns:p="http://schemas.openxmlformats.org/presentationml/2006/main">
+  <p:cSld>
+    <p:spTree>
+      <p:nvGrpSpPr>
+        <p:cNvPr id="1" name=""/>
+        <p:cNvGrpSpPr/>
+        <p:nvPr/>
+      </p:nvGrpSpPr>
+      <p:grpSpPr>
+        <a:xfrm>
+          <a:off x="0" y="0"/>
+          <a:ext cx="0" cy="0"/>
+          <a:chOff x="0" y="0"/>
+          <a:chExt cx="0" cy="0"/>
+        </a:xfrm>
+      </p:grpSpPr>
+      <p:sp>
+        <p:nvSpPr>
+          <p:cNvPr id="2" name="Title 1"/>
+          <p:cNvSpPr>
+            <a:spLocks noGrp="1"/>
+          </p:cNvSpPr>
+          <p:nvPr>
+            <p:ph type="title"/>
+          </p:nvPr>
+        </p:nvSpPr>
+        <p:spPr/>
+        <p:txBody>
+          <a:bodyPr/>
+          <a:lstStyle/>
+          <a:p>
+            <a:r>
+              <a:rPr lang="en-US" dirty="0" smtClean="0"/>
+              <a:t>Centralized vs Distributed</a:t>
+            </a:r>
+            <a:endParaRPr lang="en-US" dirty="0"/>
+          </a:p>
+        </p:txBody>
+      </p:sp>
+      <p:sp>
+        <p:nvSpPr>
+          <p:cNvPr id="4" name="Slide Number Placeholder 3"/>
+          <p:cNvSpPr>
+            <a:spLocks noGrp="1"/>
+          </p:cNvSpPr>
+          <p:nvPr>
+            <p:ph type="sldNum" sz="quarter" idx="10"/>
+          </p:nvPr>
+        </p:nvSpPr>
+        <p:spPr/>
+        <p:txBody>
+          <a:bodyPr/>
+          <a:lstStyle/>
+          <a:p>
+            <a:fld id="{2C54C99C-CE89-4C76-8DB1-E15D6EAB6684}" type="slidenum">
+              <a:rPr lang="en-US" smtClean="0"/>
+              <a:pPr/>
+              <a:t>4</a:t>
+            </a:fld>
+            <a:endParaRPr lang="en-US" dirty="0"/>
+          </a:p>
+        </p:txBody>
+      </p:sp>
+      <p:pic>
+        <p:nvPicPr>
+          <p:cNvPr id="2052" name="Picture 4" descr="centralized-vs-distributed"/>
+          <p:cNvPicPr>
+            <a:picLocks noGrp="1" noChangeAspect="1" noChangeArrowheads="1"/>
+          </p:cNvPicPr>
+          <p:nvPr>
+            <p:ph idx="1"/>
+          </p:nvPr>
+        </p:nvPicPr>
+        <p:blipFill>
+          <a:blip r:embed="rId2">
+            <a:extLst>
+              <a:ext uri="{28A0092B-C50C-407E-A947-70E740481C1C}">
+                <a14:useLocalDpi xmlns:a14="http://schemas.microsoft.com/office/drawing/2010/main" val="0"/>
+              </a:ext>
+            </a:extLst>
+          </a:blip>
+          <a:srcRect/>
+          <a:stretch>
+            <a:fillRect/>
+          </a:stretch>
+        </p:blipFill>
+        <p:spPr bwMode="auto">
+          <a:xfrm>
+            <a:off x="2044342" y="1065213"/>
+            <a:ext cx="5029916" cy="5049837"/>
+          </a:xfrm>
+          <a:prstGeom prst="rect">
+            <a:avLst/>
+          </a:prstGeom>
+          <a:noFill/>
+          <a:extLst>
+            <a:ext uri="{909E8E84-426E-40DD-AFC4-6F175D3DCCD1}">
+              <a14:hiddenFill xmlns:a14="http://schemas.microsoft.com/office/drawing/2010/main">
+                <a:solidFill>
+                  <a:srgbClr val="FFFFFF"/>
+                </a:solidFill>
+              </a14:hiddenFill>
+            </a:ext>
+          </a:extLst>
+        </p:spPr>
+      </p:pic>
+    </p:spTree>
+    <p:extLst>
+      <p:ext uri="{BB962C8B-B14F-4D97-AF65-F5344CB8AC3E}">
+        <p14:creationId xmlns:p14="http://schemas.microsoft.com/office/powerpoint/2010/main" val="2406177149"/>
+      </p:ext>
+    </p:extLst>
+  </p:cSld>
+  <p:clrMapOvr>
+    <a:masterClrMapping/>
+  </p:clrMapOvr>
+  <p:timing>
+    <p:tnLst>
+      <p:par>
+        <p:cTn id="1" dur="indefinite" restart="never" nodeType="tmRoot"/>
+      </p:par>
+    </p:tnLst>
+  </p:timing>
+</p:sld>
+</file>
+
+<file path=ppt/slides/slide5.xml><?xml version="1.0" encoding="utf-8"?>
+<p:sld xmlns:a="http://schemas.openxmlformats.org/drawingml/2006/main" xmlns:r="http://schemas.openxmlformats.org/officeDocument/2006/relationships" xmlns:p="http://schemas.openxmlformats.org/presentationml/2006/main">
+  <p:cSld>
+    <p:spTree>
+      <p:nvGrpSpPr>
+        <p:cNvPr id="1" name=""/>
+        <p:cNvGrpSpPr/>
+        <p:nvPr/>
+      </p:nvGrpSpPr>
+      <p:grpSpPr>
+        <a:xfrm>
+          <a:off x="0" y="0"/>
+          <a:ext cx="0" cy="0"/>
+          <a:chOff x="0" y="0"/>
+          <a:chExt cx="0" cy="0"/>
+        </a:xfrm>
+      </p:grpSpPr>
+      <p:pic>
+        <p:nvPicPr>
+          <p:cNvPr id="3074" name="Picture 2" descr="screenshot"/>
+          <p:cNvPicPr>
+            <a:picLocks noChangeAspect="1" noChangeArrowheads="1"/>
+          </p:cNvPicPr>
+          <p:nvPr/>
+        </p:nvPicPr>
+        <p:blipFill>
+          <a:blip r:embed="rId2">
+            <a:extLst>
+              <a:ext uri="{28A0092B-C50C-407E-A947-70E740481C1C}">
+                <a14:useLocalDpi xmlns:a14="http://schemas.microsoft.com/office/drawing/2010/main" val="0"/>
+              </a:ext>
+            </a:extLst>
+          </a:blip>
+          <a:srcRect/>
+          <a:stretch>
+            <a:fillRect/>
+          </a:stretch>
+        </p:blipFill>
+        <p:spPr bwMode="auto">
+          <a:xfrm>
+            <a:off x="6435927" y="815975"/>
+            <a:ext cx="2708073" cy="2103663"/>
+          </a:xfrm>
+          <a:prstGeom prst="rect">
+            <a:avLst/>
+          </a:prstGeom>
+          <a:noFill/>
+          <a:extLst>
+            <a:ext uri="{909E8E84-426E-40DD-AFC4-6F175D3DCCD1}">
+              <a14:hiddenFill xmlns:a14="http://schemas.microsoft.com/office/drawing/2010/main">
+                <a:solidFill>
+                  <a:srgbClr val="FFFFFF"/>
+                </a:solidFill>
+              </a14:hiddenFill>
+            </a:ext>
+          </a:extLst>
+        </p:spPr>
+      </p:pic>
+      <p:sp>
+        <p:nvSpPr>
+          <p:cNvPr id="2" name="Title 1"/>
+          <p:cNvSpPr>
+            <a:spLocks noGrp="1"/>
+          </p:cNvSpPr>
+          <p:nvPr>
+            <p:ph type="title"/>
+          </p:nvPr>
+        </p:nvSpPr>
+        <p:spPr/>
+        <p:txBody>
+          <a:bodyPr/>
+          <a:lstStyle/>
+          <a:p>
+            <a:r>
+              <a:rPr lang="en-US" dirty="0" smtClean="0"/>
+              <a:t>Why use Distributed?</a:t>
+            </a:r>
+            <a:endParaRPr lang="en-US" dirty="0"/>
+          </a:p>
+        </p:txBody>
+      </p:sp>
+      <p:sp>
+        <p:nvSpPr>
+          <p:cNvPr id="3" name="Content Placeholder 2"/>
+          <p:cNvSpPr>
+            <a:spLocks noGrp="1"/>
+          </p:cNvSpPr>
+          <p:nvPr>
+            <p:ph idx="1"/>
+          </p:nvPr>
+        </p:nvSpPr>
+        <p:spPr/>
+        <p:txBody>
+          <a:bodyPr/>
+          <a:lstStyle/>
+          <a:p>
+            <a:r>
+              <a:rPr lang="en-US" dirty="0" smtClean="0"/>
+              <a:t>Each developer has their own local repository</a:t>
+            </a:r>
+          </a:p>
+          <a:p>
+            <a:pPr lvl="1"/>
+            <a:r>
+              <a:rPr lang="en-US" dirty="0" smtClean="0"/>
+              <a:t>This is separate from their “working copy”</a:t>
+            </a:r>
+          </a:p>
+          <a:p>
+            <a:pPr lvl="1"/>
+            <a:endParaRPr lang="en-US" dirty="0"/>
+          </a:p>
+          <a:p>
+            <a:r>
+              <a:rPr lang="en-US" dirty="0" smtClean="0"/>
+              <a:t>Allows commits off-line</a:t>
+            </a:r>
+          </a:p>
+          <a:p>
+            <a:endParaRPr lang="en-US" dirty="0"/>
+          </a:p>
+          <a:p>
+            <a:r>
+              <a:rPr lang="en-US" dirty="0" smtClean="0"/>
+              <a:t>Can be configured to use a remote “SVN style” repository</a:t>
+            </a:r>
+          </a:p>
+          <a:p>
+            <a:endParaRPr lang="en-US" dirty="0"/>
+          </a:p>
+          <a:p>
+            <a:r>
+              <a:rPr lang="en-US" dirty="0" smtClean="0"/>
+              <a:t>Speed increase for commits, logs, diffs, update, blame</a:t>
+            </a:r>
+          </a:p>
+          <a:p>
+            <a:endParaRPr lang="en-US" dirty="0"/>
+          </a:p>
+          <a:p>
+            <a:r>
+              <a:rPr lang="en-US" dirty="0" smtClean="0"/>
+              <a:t>Complete local back-up</a:t>
+            </a:r>
+          </a:p>
+          <a:p>
+            <a:pPr lvl="1"/>
+            <a:r>
+              <a:rPr lang="en-US" dirty="0" smtClean="0"/>
+              <a:t>hard to lose data</a:t>
+            </a:r>
+          </a:p>
+          <a:p>
+            <a:endParaRPr lang="en-US" dirty="0"/>
+          </a:p>
+          <a:p>
+            <a:r>
+              <a:rPr lang="en-US" dirty="0" smtClean="0"/>
+              <a:t>Can use different workflows</a:t>
+            </a:r>
+          </a:p>
+          <a:p>
+            <a:pPr lvl="1"/>
+            <a:r>
+              <a:rPr lang="en-US" dirty="0" smtClean="0"/>
+              <a:t>E.g. integrator approach</a:t>
+            </a:r>
+          </a:p>
+          <a:p>
+            <a:endParaRPr lang="en-US" dirty="0"/>
+          </a:p>
+        </p:txBody>
+      </p:sp>
+      <p:sp>
+        <p:nvSpPr>
+          <p:cNvPr id="4" name="Slide Number Placeholder 3"/>
+          <p:cNvSpPr>
+            <a:spLocks noGrp="1"/>
+          </p:cNvSpPr>
+          <p:nvPr>
+            <p:ph type="sldNum" sz="quarter" idx="10"/>
+          </p:nvPr>
+        </p:nvSpPr>
+        <p:spPr/>
+        <p:txBody>
+          <a:bodyPr/>
+          <a:lstStyle/>
+          <a:p>
+            <a:fld id="{2C54C99C-CE89-4C76-8DB1-E15D6EAB6684}" type="slidenum">
+              <a:rPr lang="en-US" smtClean="0"/>
+              <a:pPr/>
+              <a:t>5</a:t>
+            </a:fld>
+            <a:endParaRPr lang="en-US" dirty="0"/>
+          </a:p>
+        </p:txBody>
+      </p:sp>
+      <p:pic>
+        <p:nvPicPr>
+          <p:cNvPr id="3076" name="Picture 4" descr="An example distributed workflow involving several Git repositories"/>
+          <p:cNvPicPr>
+            <a:picLocks noChangeAspect="1" noChangeArrowheads="1"/>
+          </p:cNvPicPr>
+          <p:nvPr/>
+        </p:nvPicPr>
+        <p:blipFill>
+          <a:blip r:embed="rId3">
+            <a:extLst>
+              <a:ext uri="{28A0092B-C50C-407E-A947-70E740481C1C}">
+                <a14:useLocalDpi xmlns:a14="http://schemas.microsoft.com/office/drawing/2010/main" val="0"/>
+              </a:ext>
+            </a:extLst>
+          </a:blip>
+          <a:srcRect/>
+          <a:stretch>
+            <a:fillRect/>
+          </a:stretch>
+        </p:blipFill>
+        <p:spPr bwMode="auto">
+          <a:xfrm>
+            <a:off x="5216335" y="4764830"/>
+            <a:ext cx="3876421" cy="1600055"/>
+          </a:xfrm>
+          <a:prstGeom prst="rect">
+            <a:avLst/>
+          </a:prstGeom>
+          <a:noFill/>
+          <a:extLst>
+            <a:ext uri="{909E8E84-426E-40DD-AFC4-6F175D3DCCD1}">
+              <a14:hiddenFill xmlns:a14="http://schemas.microsoft.com/office/drawing/2010/main">
+                <a:solidFill>
+                  <a:srgbClr val="FFFFFF"/>
+                </a:solidFill>
+              </a14:hiddenFill>
+            </a:ext>
+          </a:extLst>
+        </p:spPr>
+      </p:pic>
+    </p:spTree>
+    <p:extLst>
+      <p:ext uri="{BB962C8B-B14F-4D97-AF65-F5344CB8AC3E}">
+        <p14:creationId xmlns:p14="http://schemas.microsoft.com/office/powerpoint/2010/main" val="1417784465"/>
+      </p:ext>
+    </p:extLst>
+  </p:cSld>
+  <p:clrMapOvr>
+    <a:masterClrMapping/>
+  </p:clrMapOvr>
+  <p:timing>
+    <p:tnLst>
+      <p:par>
+        <p:cTn id="1" dur="indefinite" restart="never" nodeType="tmRoot"/>
+      </p:par>
+    </p:tnLst>
+  </p:timing>
+</p:sld>
+</file>
+
+<file path=ppt/slides/slide6.xml><?xml version="1.0" encoding="utf-8"?>
+<p:sld xmlns:a="http://schemas.openxmlformats.org/drawingml/2006/main" xmlns:r="http://schemas.openxmlformats.org/officeDocument/2006/relationships" xmlns:p="http://schemas.openxmlformats.org/presentationml/2006/main">
+  <p:cSld>
+    <p:spTree>
+      <p:nvGrpSpPr>
+        <p:cNvPr id="1" name=""/>
+        <p:cNvGrpSpPr/>
+        <p:nvPr/>
+      </p:nvGrpSpPr>
+      <p:grpSpPr>
+        <a:xfrm>
+          <a:off x="0" y="0"/>
+          <a:ext cx="0" cy="0"/>
+          <a:chOff x="0" y="0"/>
+          <a:chExt cx="0" cy="0"/>
+        </a:xfrm>
+      </p:grpSpPr>
+      <p:sp>
+        <p:nvSpPr>
+          <p:cNvPr id="2" name="Title 1"/>
+          <p:cNvSpPr>
+            <a:spLocks noGrp="1"/>
+          </p:cNvSpPr>
+          <p:nvPr>
+            <p:ph type="title"/>
+          </p:nvPr>
+        </p:nvSpPr>
+        <p:spPr/>
+        <p:txBody>
+          <a:bodyPr/>
+          <a:lstStyle/>
+          <a:p>
+            <a:r>
+              <a:rPr lang="en-US" dirty="0" smtClean="0"/>
+              <a:t>Repository Structure</a:t>
+            </a:r>
+            <a:endParaRPr lang="en-US" dirty="0"/>
+          </a:p>
+        </p:txBody>
+      </p:sp>
+      <p:sp>
+        <p:nvSpPr>
+          <p:cNvPr id="3" name="Content Placeholder 2"/>
+          <p:cNvSpPr>
+            <a:spLocks noGrp="1"/>
+          </p:cNvSpPr>
+          <p:nvPr>
+            <p:ph idx="1"/>
+          </p:nvPr>
+        </p:nvSpPr>
+        <p:spPr/>
+        <p:txBody>
+          <a:bodyPr/>
+          <a:lstStyle/>
+          <a:p>
+            <a:r>
+              <a:rPr lang="en-US" b="1" dirty="0" smtClean="0"/>
+              <a:t>SVN</a:t>
+            </a:r>
+          </a:p>
+          <a:p>
+            <a:pPr lvl="1"/>
+            <a:r>
+              <a:rPr lang="en-US" dirty="0"/>
+              <a:t>t</a:t>
+            </a:r>
+            <a:r>
+              <a:rPr lang="en-US" dirty="0" smtClean="0"/>
+              <a:t>runk</a:t>
+            </a:r>
+          </a:p>
+          <a:p>
+            <a:pPr lvl="1"/>
+            <a:r>
+              <a:rPr lang="en-US" dirty="0" smtClean="0"/>
+              <a:t>branches</a:t>
+            </a:r>
+          </a:p>
+          <a:p>
+            <a:pPr lvl="2"/>
+            <a:r>
+              <a:rPr lang="en-US" dirty="0" smtClean="0"/>
+              <a:t>A copy of the project in another folder</a:t>
+            </a:r>
+          </a:p>
+          <a:p>
+            <a:pPr lvl="1"/>
+            <a:r>
+              <a:rPr lang="en-US" dirty="0" smtClean="0"/>
+              <a:t>tags</a:t>
+            </a:r>
+            <a:endParaRPr lang="en-US" dirty="0"/>
+          </a:p>
+          <a:p>
+            <a:r>
+              <a:rPr lang="en-US" dirty="0" smtClean="0"/>
+              <a:t>URLs are used to point to all locations.</a:t>
+            </a:r>
+          </a:p>
+          <a:p>
+            <a:endParaRPr lang="en-US" dirty="0"/>
+          </a:p>
+          <a:p>
+            <a:r>
+              <a:rPr lang="en-US" b="1" dirty="0" smtClean="0"/>
+              <a:t>Git</a:t>
+            </a:r>
+          </a:p>
+          <a:p>
+            <a:pPr lvl="1"/>
+            <a:r>
+              <a:rPr lang="en-US" dirty="0" smtClean="0"/>
+              <a:t>Consist of a single “.git” folder</a:t>
+            </a:r>
+          </a:p>
+          <a:p>
+            <a:pPr lvl="2"/>
+            <a:r>
+              <a:rPr lang="en-US" dirty="0" smtClean="0"/>
+              <a:t>Located in root of a project</a:t>
+            </a:r>
+          </a:p>
+          <a:p>
+            <a:pPr lvl="1"/>
+            <a:r>
+              <a:rPr lang="en-US" dirty="0" smtClean="0"/>
+              <a:t>Branches/tags are addressed via commands</a:t>
+            </a:r>
+          </a:p>
+          <a:p>
+            <a:pPr lvl="2"/>
+            <a:r>
+              <a:rPr lang="en-US" dirty="0" smtClean="0"/>
+              <a:t>A pointer to a certain revision</a:t>
+            </a:r>
+          </a:p>
+          <a:p>
+            <a:r>
+              <a:rPr lang="en-US" dirty="0" smtClean="0"/>
+              <a:t>URL only points to the location of the repository</a:t>
+            </a:r>
+          </a:p>
+        </p:txBody>
+      </p:sp>
+      <p:sp>
+        <p:nvSpPr>
+          <p:cNvPr id="4" name="Slide Number Placeholder 3"/>
+          <p:cNvSpPr>
+            <a:spLocks noGrp="1"/>
+          </p:cNvSpPr>
+          <p:nvPr>
+            <p:ph type="sldNum" sz="quarter" idx="10"/>
+          </p:nvPr>
+        </p:nvSpPr>
+        <p:spPr/>
+        <p:txBody>
+          <a:bodyPr/>
+          <a:lstStyle/>
+          <a:p>
+            <a:fld id="{2C54C99C-CE89-4C76-8DB1-E15D6EAB6684}" type="slidenum">
+              <a:rPr lang="en-US" smtClean="0"/>
+              <a:pPr/>
+              <a:t>6</a:t>
+            </a:fld>
+            <a:endParaRPr lang="en-US" dirty="0"/>
+          </a:p>
+        </p:txBody>
+      </p:sp>
+      <p:pic>
+        <p:nvPicPr>
+          <p:cNvPr id="5" name="Picture 4"/>
+          <p:cNvPicPr>
+            <a:picLocks noChangeAspect="1"/>
+          </p:cNvPicPr>
+          <p:nvPr/>
+        </p:nvPicPr>
+        <p:blipFill>
+          <a:blip r:embed="rId2"/>
+          <a:stretch>
+            <a:fillRect/>
+          </a:stretch>
+        </p:blipFill>
+        <p:spPr>
+          <a:xfrm>
+            <a:off x="6520684" y="815975"/>
+            <a:ext cx="2623316" cy="2559849"/>
+          </a:xfrm>
+          <a:prstGeom prst="rect">
+            <a:avLst/>
+          </a:prstGeom>
+        </p:spPr>
+      </p:pic>
+      <p:pic>
+        <p:nvPicPr>
+          <p:cNvPr id="6" name="Picture 5"/>
+          <p:cNvPicPr>
+            <a:picLocks noChangeAspect="1"/>
+          </p:cNvPicPr>
+          <p:nvPr/>
+        </p:nvPicPr>
+        <p:blipFill>
+          <a:blip r:embed="rId3"/>
+          <a:stretch>
+            <a:fillRect/>
+          </a:stretch>
+        </p:blipFill>
+        <p:spPr>
+          <a:xfrm>
+            <a:off x="6650078" y="3933825"/>
+            <a:ext cx="2398422" cy="2535174"/>
+          </a:xfrm>
+          <a:prstGeom prst="rect">
+            <a:avLst/>
+          </a:prstGeom>
+        </p:spPr>
+      </p:pic>
+    </p:spTree>
+    <p:extLst>
+      <p:ext uri="{BB962C8B-B14F-4D97-AF65-F5344CB8AC3E}">
+        <p14:creationId xmlns:p14="http://schemas.microsoft.com/office/powerpoint/2010/main" val="1791898961"/>
+      </p:ext>
+    </p:extLst>
+  </p:cSld>
+  <p:clrMapOvr>
+    <a:masterClrMapping/>
+  </p:clrMapOvr>
+  <p:timing>
+    <p:tnLst>
+      <p:par>
+        <p:cTn id="1" dur="indefinite" restart="never" nodeType="tmRoot"/>
+      </p:par>
+    </p:tnLst>
+  </p:timing>
+</p:sld>
+</file>
+
+<file path=ppt/slides/slide7.xml><?xml version="1.0" encoding="utf-8"?>
+<p:sld xmlns:a="http://schemas.openxmlformats.org/drawingml/2006/main" xmlns:r="http://schemas.openxmlformats.org/officeDocument/2006/relationships" xmlns:p="http://schemas.openxmlformats.org/presentationml/2006/main">
+  <p:cSld>
+    <p:spTree>
+      <p:nvGrpSpPr>
+        <p:cNvPr id="1" name=""/>
+        <p:cNvGrpSpPr/>
+        <p:nvPr/>
+      </p:nvGrpSpPr>
+      <p:grpSpPr>
+        <a:xfrm>
+          <a:off x="0" y="0"/>
+          <a:ext cx="0" cy="0"/>
+          <a:chOff x="0" y="0"/>
+          <a:chExt cx="0" cy="0"/>
+        </a:xfrm>
+      </p:grpSpPr>
+      <p:sp>
+        <p:nvSpPr>
+          <p:cNvPr id="2" name="Title 1"/>
+          <p:cNvSpPr>
+            <a:spLocks noGrp="1"/>
+          </p:cNvSpPr>
+          <p:nvPr>
+            <p:ph type="title"/>
+          </p:nvPr>
+        </p:nvSpPr>
+        <p:spPr/>
+        <p:txBody>
+          <a:bodyPr/>
+          <a:lstStyle/>
+          <a:p>
+            <a:r>
+              <a:rPr lang="en-US" dirty="0" smtClean="0"/>
+              <a:t>Committing</a:t>
+            </a:r>
+            <a:endParaRPr lang="en-US" dirty="0"/>
+          </a:p>
+        </p:txBody>
+      </p:sp>
+      <p:sp>
+        <p:nvSpPr>
+          <p:cNvPr id="3" name="Content Placeholder 2"/>
+          <p:cNvSpPr>
+            <a:spLocks noGrp="1"/>
+          </p:cNvSpPr>
+          <p:nvPr>
+            <p:ph idx="1"/>
+          </p:nvPr>
+        </p:nvSpPr>
+        <p:spPr/>
+        <p:txBody>
+          <a:bodyPr/>
+          <a:lstStyle/>
+          <a:p>
+            <a:r>
+              <a:rPr lang="en-US" b="1" dirty="0" smtClean="0"/>
+              <a:t>SVN</a:t>
+            </a:r>
+          </a:p>
+          <a:p>
+            <a:pPr lvl="1"/>
+            <a:r>
+              <a:rPr lang="en-US" dirty="0" smtClean="0"/>
+              <a:t>Can only commit when connected to central repository</a:t>
+            </a:r>
+          </a:p>
+          <a:p>
+            <a:pPr lvl="1"/>
+            <a:r>
+              <a:rPr lang="en-US" dirty="0" smtClean="0"/>
+              <a:t>Commit gets instantly transferred to central repository</a:t>
+            </a:r>
+          </a:p>
+          <a:p>
+            <a:pPr lvl="1"/>
+            <a:r>
+              <a:rPr lang="en-US" dirty="0" smtClean="0"/>
+              <a:t>Commit gets assigned an ascending revision number</a:t>
+            </a:r>
+          </a:p>
+          <a:p>
+            <a:pPr lvl="1"/>
+            <a:endParaRPr lang="en-US" dirty="0"/>
+          </a:p>
+          <a:p>
+            <a:r>
+              <a:rPr lang="en-US" b="1" dirty="0" smtClean="0"/>
+              <a:t>Git</a:t>
+            </a:r>
+          </a:p>
+          <a:p>
+            <a:pPr lvl="1"/>
+            <a:r>
+              <a:rPr lang="en-US" dirty="0" smtClean="0"/>
+              <a:t>Can commit to local repository whenever</a:t>
+            </a:r>
+          </a:p>
+          <a:p>
+            <a:pPr lvl="1"/>
+            <a:r>
+              <a:rPr lang="en-US" dirty="0" smtClean="0"/>
+              <a:t>Use “push” command to send commit to another repository</a:t>
+            </a:r>
+          </a:p>
+          <a:p>
+            <a:pPr lvl="1"/>
+            <a:r>
+              <a:rPr lang="en-US" dirty="0" smtClean="0"/>
+              <a:t>Commit gets assigned a SHA-1 id</a:t>
+            </a:r>
+          </a:p>
+          <a:p>
+            <a:pPr lvl="2"/>
+            <a:r>
+              <a:rPr lang="en-US" dirty="0" smtClean="0"/>
+              <a:t>Used for data integrity</a:t>
+            </a:r>
+          </a:p>
+          <a:p>
+            <a:pPr lvl="2"/>
+            <a:r>
+              <a:rPr lang="en-US" dirty="0" smtClean="0"/>
+              <a:t>Commit id will change if the commit or history changes</a:t>
+            </a:r>
+          </a:p>
+          <a:p>
+            <a:pPr lvl="1"/>
+            <a:r>
+              <a:rPr lang="en-US" dirty="0" smtClean="0"/>
+              <a:t>Unique “staging area” which allows part of files to be committed</a:t>
+            </a:r>
+          </a:p>
+          <a:p>
+            <a:pPr marL="342900" lvl="1" indent="0">
+              <a:buNone/>
+            </a:pPr>
+            <a:endParaRPr lang="en-US" dirty="0"/>
+          </a:p>
+        </p:txBody>
+      </p:sp>
+      <p:sp>
+        <p:nvSpPr>
+          <p:cNvPr id="4" name="Slide Number Placeholder 3"/>
+          <p:cNvSpPr>
+            <a:spLocks noGrp="1"/>
+          </p:cNvSpPr>
+          <p:nvPr>
+            <p:ph type="sldNum" sz="quarter" idx="10"/>
+          </p:nvPr>
+        </p:nvSpPr>
+        <p:spPr/>
+        <p:txBody>
+          <a:bodyPr/>
+          <a:lstStyle/>
+          <a:p>
+            <a:fld id="{2C54C99C-CE89-4C76-8DB1-E15D6EAB6684}" type="slidenum">
+              <a:rPr lang="en-US" smtClean="0"/>
+              <a:pPr/>
+              <a:t>7</a:t>
+            </a:fld>
+            <a:endParaRPr lang="en-US" dirty="0"/>
+          </a:p>
+        </p:txBody>
+      </p:sp>
+    </p:spTree>
+    <p:extLst>
+      <p:ext uri="{BB962C8B-B14F-4D97-AF65-F5344CB8AC3E}">
+        <p14:creationId xmlns:p14="http://schemas.microsoft.com/office/powerpoint/2010/main" val="1921723073"/>
+      </p:ext>
+    </p:extLst>
+  </p:cSld>
+  <p:clrMapOvr>
+    <a:masterClrMapping/>
+  </p:clrMapOvr>
+  <p:timing>
+    <p:tnLst>
+      <p:par>
+        <p:cTn id="1" dur="indefinite" restart="never" nodeType="tmRoot"/>
+      </p:par>
+    </p:tnLst>
+  </p:timing>
+</p:sld>
+</file>
+
+<file path=ppt/slides/slide8.xml><?xml version="1.0" encoding="utf-8"?>
+<p:sld xmlns:a="http://schemas.openxmlformats.org/drawingml/2006/main" xmlns:r="http://schemas.openxmlformats.org/officeDocument/2006/relationships" xmlns:p="http://schemas.openxmlformats.org/presentationml/2006/main">
+  <p:cSld>
+    <p:spTree>
+      <p:nvGrpSpPr>
+        <p:cNvPr id="1" name=""/>
+        <p:cNvGrpSpPr/>
+        <p:nvPr/>
+      </p:nvGrpSpPr>
+      <p:grpSpPr>
+        <a:xfrm>
+          <a:off x="0" y="0"/>
+          <a:ext cx="0" cy="0"/>
+          <a:chOff x="0" y="0"/>
+          <a:chExt cx="0" cy="0"/>
+        </a:xfrm>
+      </p:grpSpPr>
+      <p:sp>
+        <p:nvSpPr>
+          <p:cNvPr id="2" name="Title 1"/>
+          <p:cNvSpPr>
+            <a:spLocks noGrp="1"/>
+          </p:cNvSpPr>
+          <p:nvPr>
+            <p:ph type="title"/>
+          </p:nvPr>
+        </p:nvSpPr>
+        <p:spPr/>
+        <p:txBody>
+          <a:bodyPr/>
+          <a:lstStyle/>
+          <a:p>
+            <a:r>
+              <a:rPr lang="en-US" dirty="0" smtClean="0"/>
+              <a:t>Branching</a:t>
+            </a:r>
+            <a:endParaRPr lang="en-US" dirty="0"/>
+          </a:p>
+        </p:txBody>
+      </p:sp>
+      <p:sp>
+        <p:nvSpPr>
+          <p:cNvPr id="3" name="Content Placeholder 2"/>
+          <p:cNvSpPr>
+            <a:spLocks noGrp="1"/>
+          </p:cNvSpPr>
+          <p:nvPr>
+            <p:ph idx="1"/>
+          </p:nvPr>
+        </p:nvSpPr>
+        <p:spPr/>
+        <p:txBody>
+          <a:bodyPr/>
+          <a:lstStyle/>
+          <a:p>
+            <a:r>
+              <a:rPr lang="en-US" b="1" dirty="0"/>
+              <a:t>SVN</a:t>
+            </a:r>
+          </a:p>
+          <a:p>
+            <a:pPr lvl="1"/>
+            <a:r>
+              <a:rPr lang="en-US" dirty="0" smtClean="0"/>
+              <a:t>Remote branches only</a:t>
+            </a:r>
+          </a:p>
+          <a:p>
+            <a:pPr lvl="1"/>
+            <a:r>
+              <a:rPr lang="en-US" dirty="0" smtClean="0"/>
+              <a:t>Forces branches to be visible to all repository users</a:t>
+            </a:r>
+          </a:p>
+          <a:p>
+            <a:pPr marL="342900" lvl="1" indent="0">
+              <a:buNone/>
+            </a:pPr>
+            <a:endParaRPr lang="en-US" dirty="0"/>
+          </a:p>
+          <a:p>
+            <a:r>
+              <a:rPr lang="en-US" b="1" dirty="0"/>
+              <a:t>Git</a:t>
+            </a:r>
+          </a:p>
+          <a:p>
+            <a:pPr lvl="1"/>
+            <a:r>
+              <a:rPr lang="en-US" dirty="0" smtClean="0"/>
+              <a:t>Local and remote branches</a:t>
+            </a:r>
+          </a:p>
+          <a:p>
+            <a:pPr lvl="1"/>
+            <a:r>
+              <a:rPr lang="en-US" dirty="0" smtClean="0"/>
+              <a:t>Can create a local branch, refine it, and then distribute it to a remote repository</a:t>
+            </a:r>
+          </a:p>
+          <a:p>
+            <a:pPr lvl="1"/>
+            <a:endParaRPr lang="en-US" dirty="0"/>
+          </a:p>
+        </p:txBody>
+      </p:sp>
+      <p:sp>
+        <p:nvSpPr>
+          <p:cNvPr id="4" name="Slide Number Placeholder 3"/>
+          <p:cNvSpPr>
+            <a:spLocks noGrp="1"/>
+          </p:cNvSpPr>
+          <p:nvPr>
+            <p:ph type="sldNum" sz="quarter" idx="10"/>
+          </p:nvPr>
+        </p:nvSpPr>
+        <p:spPr/>
+        <p:txBody>
+          <a:bodyPr/>
+          <a:lstStyle/>
+          <a:p>
+            <a:fld id="{2C54C99C-CE89-4C76-8DB1-E15D6EAB6684}" type="slidenum">
+              <a:rPr lang="en-US" smtClean="0"/>
+              <a:pPr/>
+              <a:t>8</a:t>
+            </a:fld>
+            <a:endParaRPr lang="en-US" dirty="0"/>
+          </a:p>
+        </p:txBody>
+      </p:sp>
+      <p:pic>
+        <p:nvPicPr>
+          <p:cNvPr id="5" name="Picture 4"/>
+          <p:cNvPicPr>
+            <a:picLocks noChangeAspect="1"/>
+          </p:cNvPicPr>
+          <p:nvPr/>
+        </p:nvPicPr>
+        <p:blipFill>
+          <a:blip r:embed="rId2"/>
+          <a:stretch>
+            <a:fillRect/>
+          </a:stretch>
+        </p:blipFill>
+        <p:spPr>
+          <a:xfrm>
+            <a:off x="3516287" y="3426939"/>
+            <a:ext cx="5477902" cy="2853441"/>
+          </a:xfrm>
+          <a:prstGeom prst="rect">
+            <a:avLst/>
+          </a:prstGeom>
+        </p:spPr>
+      </p:pic>
+    </p:spTree>
+    <p:extLst>
+      <p:ext uri="{BB962C8B-B14F-4D97-AF65-F5344CB8AC3E}">
+        <p14:creationId xmlns:p14="http://schemas.microsoft.com/office/powerpoint/2010/main" val="880724920"/>
+      </p:ext>
+    </p:extLst>
+  </p:cSld>
+  <p:clrMapOvr>
+    <a:masterClrMapping/>
+  </p:clrMapOvr>
+</p:sld>
+</file>
+
 <file path=ppt/slides/slide9.xml><?xml version="1.0" encoding="utf-8"?>
 <p:sld xmlns:a="http://schemas.openxmlformats.org/drawingml/2006/main" xmlns:r="http://schemas.openxmlformats.org/officeDocument/2006/relationships" xmlns:p="http://schemas.openxmlformats.org/presentationml/2006/main">
   <p:cSld>
@@ -5441,7 +5903,7 @@
             <a:spLocks noGrp="1"/>
           </p:cNvSpPr>
           <p:nvPr>
-            <p:ph type="ctrTitle"/>
+            <p:ph type="title"/>
           </p:nvPr>
         </p:nvSpPr>
         <p:spPr/>
@@ -5451,8 +5913,113 @@
           <a:p>
             <a:r>
               <a:rPr lang="en-US" dirty="0" smtClean="0"/>
-              <a:t>DEMO TIME!</a:t>
-            </a:r>
+              <a:t>Rebasing vs Merging</a:t>
+            </a:r>
+            <a:endParaRPr lang="en-US" dirty="0"/>
+          </a:p>
+        </p:txBody>
+      </p:sp>
+      <p:sp>
+        <p:nvSpPr>
+          <p:cNvPr id="3" name="Content Placeholder 2"/>
+          <p:cNvSpPr>
+            <a:spLocks noGrp="1"/>
+          </p:cNvSpPr>
+          <p:nvPr>
+            <p:ph idx="1"/>
+          </p:nvPr>
+        </p:nvSpPr>
+        <p:spPr/>
+        <p:txBody>
+          <a:bodyPr/>
+          <a:lstStyle/>
+          <a:p>
+            <a:r>
+              <a:rPr lang="en-US" b="1" dirty="0" smtClean="0"/>
+              <a:t>Rebasing</a:t>
+            </a:r>
+          </a:p>
+          <a:p>
+            <a:pPr marL="1022350" lvl="1" indent="-342900">
+              <a:buFont typeface="Arial" panose="020B0604020202020204" pitchFamily="34" charset="0"/>
+              <a:buChar char="•"/>
+            </a:pPr>
+            <a:r>
+              <a:rPr lang="en-US" dirty="0" smtClean="0"/>
+              <a:t>Makes sure new commits go on top of the public branch (cleaner history)</a:t>
+            </a:r>
+          </a:p>
+          <a:p>
+            <a:pPr marL="1022350" lvl="1" indent="-342900">
+              <a:buFont typeface="Arial" panose="020B0604020202020204" pitchFamily="34" charset="0"/>
+              <a:buChar char="•"/>
+            </a:pPr>
+            <a:r>
+              <a:rPr lang="en-US" dirty="0" smtClean="0"/>
+              <a:t>Allows you to stay in sync on local topic branches</a:t>
+            </a:r>
+          </a:p>
+          <a:p>
+            <a:pPr marL="1022350" lvl="1" indent="-342900">
+              <a:buFont typeface="Arial" panose="020B0604020202020204" pitchFamily="34" charset="0"/>
+              <a:buChar char="•"/>
+            </a:pPr>
+            <a:r>
+              <a:rPr lang="en-US" dirty="0" smtClean="0"/>
+              <a:t>Commits are given a new SHA-1 id (rewriting history)</a:t>
+            </a:r>
+          </a:p>
+          <a:p>
+            <a:endParaRPr lang="en-US" dirty="0"/>
+          </a:p>
+          <a:p>
+            <a:r>
+              <a:rPr lang="en-US" b="1" dirty="0" smtClean="0"/>
+              <a:t>Merging</a:t>
+            </a:r>
+          </a:p>
+          <a:p>
+            <a:pPr marL="1022350" lvl="1" indent="-342900">
+              <a:buFont typeface="Arial" panose="020B0604020202020204" pitchFamily="34" charset="0"/>
+              <a:buChar char="•"/>
+            </a:pPr>
+            <a:r>
+              <a:rPr lang="en-US" dirty="0" smtClean="0"/>
+              <a:t>Same operation as SVN currently offers</a:t>
+            </a:r>
+          </a:p>
+          <a:p>
+            <a:pPr marL="1022350" lvl="1" indent="-342900">
+              <a:buFont typeface="Arial" panose="020B0604020202020204" pitchFamily="34" charset="0"/>
+              <a:buChar char="•"/>
+            </a:pPr>
+            <a:r>
+              <a:rPr lang="en-US" dirty="0" smtClean="0"/>
+              <a:t>Should be used on public branches to retain history</a:t>
+            </a:r>
+          </a:p>
+        </p:txBody>
+      </p:sp>
+      <p:sp>
+        <p:nvSpPr>
+          <p:cNvPr id="4" name="Slide Number Placeholder 3"/>
+          <p:cNvSpPr>
+            <a:spLocks noGrp="1"/>
+          </p:cNvSpPr>
+          <p:nvPr>
+            <p:ph type="sldNum" sz="quarter" idx="10"/>
+          </p:nvPr>
+        </p:nvSpPr>
+        <p:spPr/>
+        <p:txBody>
+          <a:bodyPr/>
+          <a:lstStyle/>
+          <a:p>
+            <a:fld id="{2C54C99C-CE89-4C76-8DB1-E15D6EAB6684}" type="slidenum">
+              <a:rPr lang="en-US" smtClean="0"/>
+              <a:pPr/>
+              <a:t>9</a:t>
+            </a:fld>
             <a:endParaRPr lang="en-US" dirty="0"/>
           </a:p>
         </p:txBody>
@@ -5460,20 +6027,13 @@
     </p:spTree>
     <p:extLst>
       <p:ext uri="{BB962C8B-B14F-4D97-AF65-F5344CB8AC3E}">
-        <p14:creationId xmlns:p14="http://schemas.microsoft.com/office/powerpoint/2010/main" val="3977825847"/>
+        <p14:creationId xmlns:p14="http://schemas.microsoft.com/office/powerpoint/2010/main" val="637755697"/>
       </p:ext>
     </p:extLst>
   </p:cSld>
   <p:clrMapOvr>
     <a:masterClrMapping/>
   </p:clrMapOvr>
-  <p:timing>
-    <p:tnLst>
-      <p:par>
-        <p:cTn id="1" dur="indefinite" restart="never" nodeType="tmRoot"/>
-      </p:par>
-    </p:tnLst>
-  </p:timing>
 </p:sld>
 </file>
 

</xml_diff>